<commit_message>
update naive bayes slides
</commit_message>
<xml_diff>
--- a/slides/13_naive_bayes.pptx
+++ b/slides/13_naive_bayes.pptx
@@ -6,7 +6,7 @@
     <p:sldMasterId id="2147483649" r:id="rId2"/>
   </p:sldMasterIdLst>
   <p:notesMasterIdLst>
-    <p:notesMasterId r:id="rId22"/>
+    <p:notesMasterId r:id="rId23"/>
   </p:notesMasterIdLst>
   <p:sldIdLst>
     <p:sldId id="258" r:id="rId3"/>
@@ -16,18 +16,19 @@
     <p:sldId id="547" r:id="rId7"/>
     <p:sldId id="548" r:id="rId8"/>
     <p:sldId id="549" r:id="rId9"/>
-    <p:sldId id="492" r:id="rId10"/>
-    <p:sldId id="504" r:id="rId11"/>
-    <p:sldId id="509" r:id="rId12"/>
-    <p:sldId id="511" r:id="rId13"/>
-    <p:sldId id="512" r:id="rId14"/>
-    <p:sldId id="518" r:id="rId15"/>
-    <p:sldId id="517" r:id="rId16"/>
-    <p:sldId id="520" r:id="rId17"/>
-    <p:sldId id="521" r:id="rId18"/>
-    <p:sldId id="539" r:id="rId19"/>
-    <p:sldId id="542" r:id="rId20"/>
-    <p:sldId id="355" r:id="rId21"/>
+    <p:sldId id="550" r:id="rId10"/>
+    <p:sldId id="492" r:id="rId11"/>
+    <p:sldId id="504" r:id="rId12"/>
+    <p:sldId id="509" r:id="rId13"/>
+    <p:sldId id="511" r:id="rId14"/>
+    <p:sldId id="512" r:id="rId15"/>
+    <p:sldId id="518" r:id="rId16"/>
+    <p:sldId id="517" r:id="rId17"/>
+    <p:sldId id="520" r:id="rId18"/>
+    <p:sldId id="521" r:id="rId19"/>
+    <p:sldId id="539" r:id="rId20"/>
+    <p:sldId id="542" r:id="rId21"/>
+    <p:sldId id="355" r:id="rId22"/>
   </p:sldIdLst>
   <p:sldSz cx="9363075" cy="5257800"/>
   <p:notesSz cx="6858000" cy="9144000"/>
@@ -250,7 +251,7 @@
           <a:p>
             <a:fld id="{DB92F479-4B50-F243-9713-1B12EC2B4BDB}" type="datetimeFigureOut">
               <a:rPr lang="en-US" smtClean="0"/>
-              <a:t>11/11/2014</a:t>
+              <a:t>11/12/2014</a:t>
             </a:fld>
             <a:endParaRPr lang="en-US"/>
           </a:p>
@@ -646,30 +647,7 @@
           <a:bodyPr/>
           <a:lstStyle/>
           <a:p>
-            <a:pPr marL="0" marR="0" indent="0" algn="l" defTabSz="457200" rtl="0" eaLnBrk="1" fontAlgn="auto" latinLnBrk="0" hangingPunct="1">
-              <a:lnSpc>
-                <a:spcPct val="100000"/>
-              </a:lnSpc>
-              <a:spcBef>
-                <a:spcPts val="0"/>
-              </a:spcBef>
-              <a:spcAft>
-                <a:spcPts val="0"/>
-              </a:spcAft>
-              <a:buClrTx/>
-              <a:buSzTx/>
-              <a:buFontTx/>
-              <a:buNone/>
-              <a:tabLst/>
-              <a:defRPr/>
-            </a:pPr>
-            <a:endParaRPr lang="en-US" sz="1200" baseline="0" dirty="0" smtClean="0">
-              <a:solidFill>
-                <a:prstClr val="black"/>
-              </a:solidFill>
-              <a:latin typeface="ArialMT"/>
-              <a:sym typeface="Wingdings"/>
-            </a:endParaRPr>
+            <a:endParaRPr lang="en-US" baseline="0" dirty="0" smtClean="0"/>
           </a:p>
         </p:txBody>
       </p:sp>
@@ -699,7 +677,7 @@
     </p:spTree>
     <p:extLst>
       <p:ext uri="{BB962C8B-B14F-4D97-AF65-F5344CB8AC3E}">
-        <p14:creationId xmlns:p14="http://schemas.microsoft.com/office/powerpoint/2010/main" val="645762702"/>
+        <p14:creationId xmlns:p14="http://schemas.microsoft.com/office/powerpoint/2010/main" val="158773868"/>
       </p:ext>
     </p:extLst>
   </p:cSld>
@@ -1609,7 +1587,30 @@
           <a:bodyPr/>
           <a:lstStyle/>
           <a:p>
-            <a:endParaRPr lang="en-US" dirty="0"/>
+            <a:pPr marL="0" marR="0" indent="0" algn="l" defTabSz="457200" rtl="0" eaLnBrk="1" fontAlgn="auto" latinLnBrk="0" hangingPunct="1">
+              <a:lnSpc>
+                <a:spcPct val="100000"/>
+              </a:lnSpc>
+              <a:spcBef>
+                <a:spcPts val="0"/>
+              </a:spcBef>
+              <a:spcAft>
+                <a:spcPts val="0"/>
+              </a:spcAft>
+              <a:buClrTx/>
+              <a:buSzTx/>
+              <a:buFontTx/>
+              <a:buNone/>
+              <a:tabLst/>
+              <a:defRPr/>
+            </a:pPr>
+            <a:endParaRPr lang="en-US" sz="1200" baseline="0" dirty="0" smtClean="0">
+              <a:solidFill>
+                <a:prstClr val="black"/>
+              </a:solidFill>
+              <a:latin typeface="ArialMT"/>
+              <a:sym typeface="Wingdings"/>
+            </a:endParaRPr>
           </a:p>
         </p:txBody>
       </p:sp>
@@ -1639,7 +1640,7 @@
     </p:spTree>
     <p:extLst>
       <p:ext uri="{BB962C8B-B14F-4D97-AF65-F5344CB8AC3E}">
-        <p14:creationId xmlns:p14="http://schemas.microsoft.com/office/powerpoint/2010/main" val="158773868"/>
+        <p14:creationId xmlns:p14="http://schemas.microsoft.com/office/powerpoint/2010/main" val="645762702"/>
       </p:ext>
     </p:extLst>
   </p:cSld>
@@ -1724,6 +1725,90 @@
     <p:extLst>
       <p:ext uri="{BB962C8B-B14F-4D97-AF65-F5344CB8AC3E}">
         <p14:creationId xmlns:p14="http://schemas.microsoft.com/office/powerpoint/2010/main" val="184081147"/>
+      </p:ext>
+    </p:extLst>
+  </p:cSld>
+  <p:clrMapOvr>
+    <a:masterClrMapping/>
+  </p:clrMapOvr>
+</p:notes>
+</file>
+
+<file path=ppt/notesSlides/notesSlide20.xml><?xml version="1.0" encoding="utf-8"?>
+<p:notes xmlns:a="http://schemas.openxmlformats.org/drawingml/2006/main" xmlns:r="http://schemas.openxmlformats.org/officeDocument/2006/relationships" xmlns:p="http://schemas.openxmlformats.org/presentationml/2006/main">
+  <p:cSld>
+    <p:spTree>
+      <p:nvGrpSpPr>
+        <p:cNvPr id="1" name=""/>
+        <p:cNvGrpSpPr/>
+        <p:nvPr/>
+      </p:nvGrpSpPr>
+      <p:grpSpPr>
+        <a:xfrm>
+          <a:off x="0" y="0"/>
+          <a:ext cx="0" cy="0"/>
+          <a:chOff x="0" y="0"/>
+          <a:chExt cx="0" cy="0"/>
+        </a:xfrm>
+      </p:grpSpPr>
+      <p:sp>
+        <p:nvSpPr>
+          <p:cNvPr id="2" name="Slide Image Placeholder 1"/>
+          <p:cNvSpPr>
+            <a:spLocks noGrp="1" noRot="1" noChangeAspect="1"/>
+          </p:cNvSpPr>
+          <p:nvPr>
+            <p:ph type="sldImg"/>
+          </p:nvPr>
+        </p:nvSpPr>
+        <p:spPr/>
+      </p:sp>
+      <p:sp>
+        <p:nvSpPr>
+          <p:cNvPr id="3" name="Notes Placeholder 2"/>
+          <p:cNvSpPr>
+            <a:spLocks noGrp="1"/>
+          </p:cNvSpPr>
+          <p:nvPr>
+            <p:ph type="body" idx="1"/>
+          </p:nvPr>
+        </p:nvSpPr>
+        <p:spPr/>
+        <p:txBody>
+          <a:bodyPr/>
+          <a:lstStyle/>
+          <a:p>
+            <a:endParaRPr lang="en-US" dirty="0"/>
+          </a:p>
+        </p:txBody>
+      </p:sp>
+      <p:sp>
+        <p:nvSpPr>
+          <p:cNvPr id="4" name="Slide Number Placeholder 3"/>
+          <p:cNvSpPr>
+            <a:spLocks noGrp="1"/>
+          </p:cNvSpPr>
+          <p:nvPr>
+            <p:ph type="sldNum" sz="quarter" idx="10"/>
+          </p:nvPr>
+        </p:nvSpPr>
+        <p:spPr/>
+        <p:txBody>
+          <a:bodyPr/>
+          <a:lstStyle/>
+          <a:p>
+            <a:fld id="{ADD4B5B7-85EF-4E48-AC80-2380FACD9C23}" type="slidenum">
+              <a:rPr lang="en-US" smtClean="0"/>
+              <a:t>20</a:t>
+            </a:fld>
+            <a:endParaRPr lang="en-US"/>
+          </a:p>
+        </p:txBody>
+      </p:sp>
+    </p:spTree>
+    <p:extLst>
+      <p:ext uri="{BB962C8B-B14F-4D97-AF65-F5344CB8AC3E}">
+        <p14:creationId xmlns:p14="http://schemas.microsoft.com/office/powerpoint/2010/main" val="158773868"/>
       </p:ext>
     </p:extLst>
   </p:cSld>
@@ -2396,7 +2481,30 @@
           <a:bodyPr/>
           <a:lstStyle/>
           <a:p>
-            <a:endParaRPr lang="en-US" baseline="0" dirty="0" smtClean="0"/>
+            <a:pPr marL="0" marR="0" indent="0" algn="l" defTabSz="457200" rtl="0" eaLnBrk="1" fontAlgn="auto" latinLnBrk="0" hangingPunct="1">
+              <a:lnSpc>
+                <a:spcPct val="100000"/>
+              </a:lnSpc>
+              <a:spcBef>
+                <a:spcPts val="0"/>
+              </a:spcBef>
+              <a:spcAft>
+                <a:spcPts val="0"/>
+              </a:spcAft>
+              <a:buClrTx/>
+              <a:buSzTx/>
+              <a:buFontTx/>
+              <a:buNone/>
+              <a:tabLst/>
+              <a:defRPr/>
+            </a:pPr>
+            <a:endParaRPr lang="en-US" sz="1200" baseline="0" dirty="0" smtClean="0">
+              <a:solidFill>
+                <a:prstClr val="black"/>
+              </a:solidFill>
+              <a:latin typeface="ArialMT"/>
+              <a:sym typeface="Wingdings"/>
+            </a:endParaRPr>
           </a:p>
         </p:txBody>
       </p:sp>
@@ -2426,7 +2534,7 @@
     </p:spTree>
     <p:extLst>
       <p:ext uri="{BB962C8B-B14F-4D97-AF65-F5344CB8AC3E}">
-        <p14:creationId xmlns:p14="http://schemas.microsoft.com/office/powerpoint/2010/main" val="158773868"/>
+        <p14:creationId xmlns:p14="http://schemas.microsoft.com/office/powerpoint/2010/main" val="645762702"/>
       </p:ext>
     </p:extLst>
   </p:cSld>
@@ -8922,6 +9030,139 @@
       </p:grpSpPr>
       <p:sp>
         <p:nvSpPr>
+          <p:cNvPr id="2" name="Title 1"/>
+          <p:cNvSpPr>
+            <a:spLocks noGrp="1"/>
+          </p:cNvSpPr>
+          <p:nvPr>
+            <p:ph type="title"/>
+          </p:nvPr>
+        </p:nvSpPr>
+        <p:spPr>
+          <a:xfrm>
+            <a:off x="347663" y="2705100"/>
+            <a:ext cx="8426450" cy="1828800"/>
+          </a:xfrm>
+        </p:spPr>
+        <p:txBody>
+          <a:bodyPr/>
+          <a:lstStyle/>
+          <a:p>
+            <a:pPr>
+              <a:defRPr/>
+            </a:pPr>
+            <a:r>
+              <a:rPr lang="en-US" sz="7500" dirty="0" smtClean="0"/>
+              <a:t/>
+            </a:r>
+            <a:br>
+              <a:rPr lang="en-US" sz="7500" dirty="0" smtClean="0"/>
+            </a:br>
+            <a:r>
+              <a:rPr lang="en-US" sz="7500" dirty="0" smtClean="0"/>
+              <a:t>II. Naïve </a:t>
+            </a:r>
+            <a:r>
+              <a:rPr lang="en-US" sz="7500" dirty="0" err="1" smtClean="0"/>
+              <a:t>bayes</a:t>
+            </a:r>
+            <a:r>
+              <a:rPr lang="en-US" sz="7500" dirty="0" smtClean="0"/>
+              <a:t> classification</a:t>
+            </a:r>
+            <a:endParaRPr lang="en-US" sz="7500" dirty="0"/>
+          </a:p>
+        </p:txBody>
+      </p:sp>
+      <p:sp>
+        <p:nvSpPr>
+          <p:cNvPr id="4" name="Content Placeholder 3"/>
+          <p:cNvSpPr>
+            <a:spLocks noGrp="1"/>
+          </p:cNvSpPr>
+          <p:nvPr>
+            <p:ph sz="quarter" idx="11"/>
+          </p:nvPr>
+        </p:nvSpPr>
+        <p:spPr>
+          <a:xfrm>
+            <a:off x="371475" y="495300"/>
+            <a:ext cx="6400800" cy="304800"/>
+          </a:xfrm>
+        </p:spPr>
+        <p:txBody>
+          <a:bodyPr wrap="square" lIns="91440" tIns="45720" rIns="91440" bIns="45720" numCol="1" anchor="t" anchorCtr="0" compatLnSpc="1">
+            <a:prstTxWarp prst="textNoShape">
+              <a:avLst/>
+            </a:prstTxWarp>
+          </a:bodyPr>
+          <a:lstStyle/>
+          <a:p>
+            <a:pPr marL="0" indent="0"/>
+            <a:r>
+              <a:rPr lang="en-US" cap="none" smtClean="0">
+                <a:latin typeface="PFDinTextCompPro-Bold" charset="0"/>
+                <a:ea typeface="ヒラギノ角ゴ ProN W3" charset="0"/>
+                <a:cs typeface="ヒラギノ角ゴ ProN W3" charset="0"/>
+              </a:rPr>
+              <a:t>DATA </a:t>
+            </a:r>
+            <a:r>
+              <a:rPr lang="en-US" cap="none" dirty="0" smtClean="0">
+                <a:latin typeface="PFDinTextCompPro-Bold" charset="0"/>
+                <a:ea typeface="ヒラギノ角ゴ ProN W3" charset="0"/>
+                <a:cs typeface="ヒラギノ角ゴ ProN W3" charset="0"/>
+              </a:rPr>
+              <a:t>SCIENCE</a:t>
+            </a:r>
+            <a:endParaRPr lang="en-US" cap="none" dirty="0">
+              <a:latin typeface="PFDinTextCompPro-Bold" charset="0"/>
+              <a:ea typeface="ヒラギノ角ゴ ProN W3" charset="0"/>
+              <a:cs typeface="ヒラギノ角ゴ ProN W3" charset="0"/>
+            </a:endParaRPr>
+          </a:p>
+        </p:txBody>
+      </p:sp>
+    </p:spTree>
+    <p:extLst>
+      <p:ext uri="{BB962C8B-B14F-4D97-AF65-F5344CB8AC3E}">
+        <p14:creationId xmlns:p14="http://schemas.microsoft.com/office/powerpoint/2010/main" val="2564836905"/>
+      </p:ext>
+    </p:extLst>
+  </p:cSld>
+  <p:clrMapOvr>
+    <a:masterClrMapping/>
+  </p:clrMapOvr>
+  <p:transition/>
+  <p:timing>
+    <p:tnLst>
+      <p:par>
+        <p:cTn id="1" dur="indefinite" restart="never" nodeType="tmRoot"/>
+      </p:par>
+    </p:tnLst>
+  </p:timing>
+</p:sld>
+</file>
+
+<file path=ppt/slides/slide11.xml><?xml version="1.0" encoding="utf-8"?>
+<p:sld xmlns:a="http://schemas.openxmlformats.org/drawingml/2006/main" xmlns:r="http://schemas.openxmlformats.org/officeDocument/2006/relationships" xmlns:p="http://schemas.openxmlformats.org/presentationml/2006/main">
+  <p:cSld>
+    <p:spTree>
+      <p:nvGrpSpPr>
+        <p:cNvPr id="1" name=""/>
+        <p:cNvGrpSpPr/>
+        <p:nvPr/>
+      </p:nvGrpSpPr>
+      <p:grpSpPr>
+        <a:xfrm>
+          <a:off x="0" y="0"/>
+          <a:ext cx="0" cy="0"/>
+          <a:chOff x="0" y="0"/>
+          <a:chExt cx="0" cy="0"/>
+        </a:xfrm>
+      </p:grpSpPr>
+      <p:sp>
+        <p:nvSpPr>
           <p:cNvPr id="4" name="Content Placeholder 3"/>
           <p:cNvSpPr>
             <a:spLocks noGrp="1"/>
@@ -8976,7 +9217,7 @@
               <a:pPr>
                 <a:defRPr/>
               </a:pPr>
-              <a:t>10</a:t>
+              <a:t>11</a:t>
             </a:fld>
             <a:endParaRPr lang="en-US"/>
           </a:p>
@@ -9312,7 +9553,7 @@
 </p:sld>
 </file>
 
-<file path=ppt/slides/slide11.xml><?xml version="1.0" encoding="utf-8"?>
+<file path=ppt/slides/slide12.xml><?xml version="1.0" encoding="utf-8"?>
 <p:sld xmlns:a="http://schemas.openxmlformats.org/drawingml/2006/main" xmlns:r="http://schemas.openxmlformats.org/officeDocument/2006/relationships" xmlns:p="http://schemas.openxmlformats.org/presentationml/2006/main">
   <p:cSld>
     <p:spTree>
@@ -9390,7 +9631,7 @@
               <a:pPr>
                 <a:defRPr/>
               </a:pPr>
-              <a:t>11</a:t>
+              <a:t>12</a:t>
             </a:fld>
             <a:endParaRPr lang="en-US"/>
           </a:p>
@@ -9579,7 +9820,7 @@
 </p:sld>
 </file>
 
-<file path=ppt/slides/slide12.xml><?xml version="1.0" encoding="utf-8"?>
+<file path=ppt/slides/slide13.xml><?xml version="1.0" encoding="utf-8"?>
 <p:sld xmlns:a="http://schemas.openxmlformats.org/drawingml/2006/main" xmlns:r="http://schemas.openxmlformats.org/officeDocument/2006/relationships" xmlns:p="http://schemas.openxmlformats.org/presentationml/2006/main">
   <p:cSld>
     <p:spTree>
@@ -9657,7 +9898,7 @@
               <a:pPr>
                 <a:defRPr/>
               </a:pPr>
-              <a:t>12</a:t>
+              <a:t>13</a:t>
             </a:fld>
             <a:endParaRPr lang="en-US"/>
           </a:p>
@@ -9831,7 +10072,7 @@
 </p:sld>
 </file>
 
-<file path=ppt/slides/slide13.xml><?xml version="1.0" encoding="utf-8"?>
+<file path=ppt/slides/slide14.xml><?xml version="1.0" encoding="utf-8"?>
 <p:sld xmlns:a="http://schemas.openxmlformats.org/drawingml/2006/main" xmlns:r="http://schemas.openxmlformats.org/officeDocument/2006/relationships" xmlns:p="http://schemas.openxmlformats.org/presentationml/2006/main">
   <p:cSld>
     <p:spTree>
@@ -9909,7 +10150,7 @@
               <a:pPr>
                 <a:defRPr/>
               </a:pPr>
-              <a:t>13</a:t>
+              <a:t>14</a:t>
             </a:fld>
             <a:endParaRPr lang="en-US"/>
           </a:p>
@@ -10063,7 +10304,7 @@
 </p:sld>
 </file>
 
-<file path=ppt/slides/slide14.xml><?xml version="1.0" encoding="utf-8"?>
+<file path=ppt/slides/slide15.xml><?xml version="1.0" encoding="utf-8"?>
 <p:sld xmlns:a="http://schemas.openxmlformats.org/drawingml/2006/main" xmlns:r="http://schemas.openxmlformats.org/officeDocument/2006/relationships" xmlns:p="http://schemas.openxmlformats.org/presentationml/2006/main">
   <p:cSld>
     <p:spTree>
@@ -10141,7 +10382,7 @@
               <a:pPr>
                 <a:defRPr/>
               </a:pPr>
-              <a:t>14</a:t>
+              <a:t>15</a:t>
             </a:fld>
             <a:endParaRPr lang="en-US"/>
           </a:p>
@@ -10309,7 +10550,7 @@
 </p:sld>
 </file>
 
-<file path=ppt/slides/slide15.xml><?xml version="1.0" encoding="utf-8"?>
+<file path=ppt/slides/slide16.xml><?xml version="1.0" encoding="utf-8"?>
 <p:sld xmlns:a="http://schemas.openxmlformats.org/drawingml/2006/main" xmlns:r="http://schemas.openxmlformats.org/officeDocument/2006/relationships" xmlns:p="http://schemas.openxmlformats.org/presentationml/2006/main">
   <p:cSld>
     <p:spTree>
@@ -10387,7 +10628,7 @@
               <a:pPr>
                 <a:defRPr/>
               </a:pPr>
-              <a:t>15</a:t>
+              <a:t>16</a:t>
             </a:fld>
             <a:endParaRPr lang="en-US"/>
           </a:p>
@@ -10452,7 +10693,21 @@
                 <a:latin typeface="PFDinTextCompPro-Italic"/>
                 <a:cs typeface="PFDinTextCompPro-Italic"/>
               </a:rPr>
-              <a:t>particular variable. This constitutes the training phase of the model.</a:t>
+              <a:t>particular </a:t>
+            </a:r>
+            <a:r>
+              <a:rPr lang="en-US" sz="3000" smtClean="0">
+                <a:latin typeface="PFDinTextCompPro-Italic"/>
+                <a:cs typeface="PFDinTextCompPro-Italic"/>
+              </a:rPr>
+              <a:t>feature. </a:t>
+            </a:r>
+            <a:r>
+              <a:rPr lang="en-US" sz="3000" smtClean="0">
+                <a:latin typeface="PFDinTextCompPro-Italic"/>
+                <a:cs typeface="PFDinTextCompPro-Italic"/>
+              </a:rPr>
+              <a:t>This constitutes the training phase of the model.</a:t>
             </a:r>
             <a:endParaRPr lang="en-US" sz="3000" dirty="0" smtClean="0">
               <a:latin typeface="PFDinTextCompPro-Italic"/>
@@ -10540,224 +10795,6 @@
     <p:extLst>
       <p:ext uri="{BB962C8B-B14F-4D97-AF65-F5344CB8AC3E}">
         <p14:creationId xmlns:p14="http://schemas.microsoft.com/office/powerpoint/2010/main" val="1535064868"/>
-      </p:ext>
-    </p:extLst>
-  </p:cSld>
-  <p:clrMapOvr>
-    <a:masterClrMapping/>
-  </p:clrMapOvr>
-  <p:transition/>
-  <p:timing>
-    <p:tnLst>
-      <p:par>
-        <p:cTn id="1" dur="indefinite" restart="never" nodeType="tmRoot"/>
-      </p:par>
-    </p:tnLst>
-  </p:timing>
-</p:sld>
-</file>
-
-<file path=ppt/slides/slide16.xml><?xml version="1.0" encoding="utf-8"?>
-<p:sld xmlns:a="http://schemas.openxmlformats.org/drawingml/2006/main" xmlns:r="http://schemas.openxmlformats.org/officeDocument/2006/relationships" xmlns:p="http://schemas.openxmlformats.org/presentationml/2006/main">
-  <p:cSld>
-    <p:spTree>
-      <p:nvGrpSpPr>
-        <p:cNvPr id="1" name=""/>
-        <p:cNvGrpSpPr/>
-        <p:nvPr/>
-      </p:nvGrpSpPr>
-      <p:grpSpPr>
-        <a:xfrm>
-          <a:off x="0" y="0"/>
-          <a:ext cx="0" cy="0"/>
-          <a:chOff x="0" y="0"/>
-          <a:chExt cx="0" cy="0"/>
-        </a:xfrm>
-      </p:grpSpPr>
-      <p:sp>
-        <p:nvSpPr>
-          <p:cNvPr id="4" name="Content Placeholder 3"/>
-          <p:cNvSpPr>
-            <a:spLocks noGrp="1"/>
-          </p:cNvSpPr>
-          <p:nvPr>
-            <p:ph sz="quarter" idx="11"/>
-          </p:nvPr>
-        </p:nvSpPr>
-        <p:spPr>
-          <a:xfrm>
-            <a:off x="414337" y="495300"/>
-            <a:ext cx="6400800" cy="304800"/>
-          </a:xfrm>
-        </p:spPr>
-        <p:txBody>
-          <a:bodyPr/>
-          <a:lstStyle/>
-          <a:p>
-            <a:pPr eaLnBrk="1" hangingPunct="1">
-              <a:lnSpc>
-                <a:spcPts val="2448"/>
-              </a:lnSpc>
-              <a:defRPr/>
-            </a:pPr>
-            <a:r>
-              <a:rPr lang="en-US" dirty="0" smtClean="0"/>
-              <a:t>Bayesian inference</a:t>
-            </a:r>
-          </a:p>
-        </p:txBody>
-      </p:sp>
-      <p:sp>
-        <p:nvSpPr>
-          <p:cNvPr id="8" name="Slide Number Placeholder 3"/>
-          <p:cNvSpPr>
-            <a:spLocks noGrp="1"/>
-          </p:cNvSpPr>
-          <p:nvPr>
-            <p:ph type="sldNum" sz="quarter" idx="13"/>
-          </p:nvPr>
-        </p:nvSpPr>
-        <p:spPr/>
-        <p:txBody>
-          <a:bodyPr/>
-          <a:lstStyle/>
-          <a:p>
-            <a:pPr>
-              <a:defRPr/>
-            </a:pPr>
-            <a:fld id="{BD5AD749-DAD1-6A4A-A2AA-CB20EAD0AEB7}" type="slidenum">
-              <a:rPr lang="en-US"/>
-              <a:pPr>
-                <a:defRPr/>
-              </a:pPr>
-              <a:t>16</a:t>
-            </a:fld>
-            <a:endParaRPr lang="en-US"/>
-          </a:p>
-        </p:txBody>
-      </p:sp>
-      <p:pic>
-        <p:nvPicPr>
-          <p:cNvPr id="11" name="Picture 10"/>
-          <p:cNvPicPr>
-            <a:picLocks noChangeAspect="1"/>
-          </p:cNvPicPr>
-          <p:nvPr/>
-        </p:nvPicPr>
-        <p:blipFill>
-          <a:blip r:embed="rId3"/>
-          <a:stretch>
-            <a:fillRect/>
-          </a:stretch>
-        </p:blipFill>
-        <p:spPr>
-          <a:xfrm>
-            <a:off x="1100137" y="2019300"/>
-            <a:ext cx="6723063" cy="1747782"/>
-          </a:xfrm>
-          <a:prstGeom prst="rect">
-            <a:avLst/>
-          </a:prstGeom>
-        </p:spPr>
-      </p:pic>
-      <p:sp>
-        <p:nvSpPr>
-          <p:cNvPr id="9" name="TextBox 8"/>
-          <p:cNvSpPr txBox="1"/>
-          <p:nvPr/>
-        </p:nvSpPr>
-        <p:spPr>
-          <a:xfrm>
-            <a:off x="566737" y="1104900"/>
-            <a:ext cx="8382000" cy="1015663"/>
-          </a:xfrm>
-          <a:prstGeom prst="rect">
-            <a:avLst/>
-          </a:prstGeom>
-          <a:noFill/>
-        </p:spPr>
-        <p:txBody>
-          <a:bodyPr wrap="square" rtlCol="0">
-            <a:spAutoFit/>
-          </a:bodyPr>
-          <a:lstStyle/>
-          <a:p>
-            <a:pPr algn="l"/>
-            <a:r>
-              <a:rPr lang="en-US" sz="3000" dirty="0" smtClean="0">
-                <a:latin typeface="PFDinTextCompPro-Italic"/>
-                <a:cs typeface="PFDinTextCompPro-Italic"/>
-              </a:rPr>
-              <a:t>The idea of Bayesian inference, then, is to </a:t>
-            </a:r>
-            <a:r>
-              <a:rPr lang="en-US" sz="3000" dirty="0" smtClean="0">
-                <a:latin typeface="PFDinTextCompPro-Medium"/>
-                <a:cs typeface="PFDinTextCompPro-Medium"/>
-              </a:rPr>
-              <a:t>update </a:t>
-            </a:r>
-            <a:r>
-              <a:rPr lang="en-US" sz="3000" dirty="0" smtClean="0">
-                <a:latin typeface="PFDinTextCompPro-Italic"/>
-                <a:cs typeface="PFDinTextCompPro-Italic"/>
-              </a:rPr>
-              <a:t>our beliefs about the distribution of </a:t>
-            </a:r>
-            <a:r>
-              <a:rPr lang="en-US" sz="2000" i="1" dirty="0" smtClean="0">
-                <a:latin typeface="+mn-lt"/>
-                <a:cs typeface="PFDinTextCompPro-Italic"/>
-              </a:rPr>
-              <a:t>C</a:t>
-            </a:r>
-            <a:r>
-              <a:rPr lang="en-US" sz="3000" dirty="0" smtClean="0">
-                <a:latin typeface="PFDinTextCompPro-Italic"/>
-                <a:cs typeface="PFDinTextCompPro-Italic"/>
-              </a:rPr>
-              <a:t> using the data (“evidence”) at our disposal.</a:t>
-            </a:r>
-          </a:p>
-        </p:txBody>
-      </p:sp>
-      <p:sp>
-        <p:nvSpPr>
-          <p:cNvPr id="10" name="TextBox 9"/>
-          <p:cNvSpPr txBox="1"/>
-          <p:nvPr/>
-        </p:nvSpPr>
-        <p:spPr>
-          <a:xfrm>
-            <a:off x="566737" y="3518237"/>
-            <a:ext cx="8382000" cy="553998"/>
-          </a:xfrm>
-          <a:prstGeom prst="rect">
-            <a:avLst/>
-          </a:prstGeom>
-          <a:noFill/>
-        </p:spPr>
-        <p:txBody>
-          <a:bodyPr wrap="square" rtlCol="0">
-            <a:spAutoFit/>
-          </a:bodyPr>
-          <a:lstStyle/>
-          <a:p>
-            <a:pPr algn="l"/>
-            <a:r>
-              <a:rPr lang="en-US" sz="3000" dirty="0" smtClean="0">
-                <a:latin typeface="PFDinTextCompPro-Italic"/>
-                <a:cs typeface="PFDinTextCompPro-Italic"/>
-              </a:rPr>
-              <a:t>Then we can use the posterior for prediction.</a:t>
-            </a:r>
-          </a:p>
-        </p:txBody>
-      </p:sp>
-    </p:spTree>
-    <p:extLst>
-      <p:ext uri="{BB962C8B-B14F-4D97-AF65-F5344CB8AC3E}">
-        <p14:creationId xmlns:p14="http://schemas.microsoft.com/office/powerpoint/2010/main" val="3681629127"/>
       </p:ext>
     </p:extLst>
   </p:cSld>
@@ -10820,15 +10857,7 @@
             </a:pPr>
             <a:r>
               <a:rPr lang="en-US" dirty="0" smtClean="0"/>
-              <a:t>Naïve </a:t>
-            </a:r>
-            <a:r>
-              <a:rPr lang="en-US" dirty="0" err="1" smtClean="0"/>
-              <a:t>bayes</a:t>
-            </a:r>
-            <a:r>
-              <a:rPr lang="en-US" dirty="0" smtClean="0"/>
-              <a:t> classification</a:t>
+              <a:t>Bayesian inference</a:t>
             </a:r>
           </a:p>
         </p:txBody>
@@ -10862,6 +10891,30 @@
           </a:p>
         </p:txBody>
       </p:sp>
+      <p:pic>
+        <p:nvPicPr>
+          <p:cNvPr id="11" name="Picture 10"/>
+          <p:cNvPicPr>
+            <a:picLocks noChangeAspect="1"/>
+          </p:cNvPicPr>
+          <p:nvPr/>
+        </p:nvPicPr>
+        <p:blipFill>
+          <a:blip r:embed="rId3"/>
+          <a:stretch>
+            <a:fillRect/>
+          </a:stretch>
+        </p:blipFill>
+        <p:spPr>
+          <a:xfrm>
+            <a:off x="1100137" y="2019300"/>
+            <a:ext cx="6723063" cy="1747782"/>
+          </a:xfrm>
+          <a:prstGeom prst="rect">
+            <a:avLst/>
+          </a:prstGeom>
+        </p:spPr>
+      </p:pic>
       <p:sp>
         <p:nvSpPr>
           <p:cNvPr id="9" name="TextBox 8"/>
@@ -10871,7 +10924,7 @@
         <p:spPr>
           <a:xfrm>
             <a:off x="566737" y="1104900"/>
-            <a:ext cx="8382000" cy="3939540"/>
+            <a:ext cx="8382000" cy="1015663"/>
           </a:xfrm>
           <a:prstGeom prst="rect">
             <a:avLst/>
@@ -10890,127 +10943,76 @@
                 <a:latin typeface="PFDinTextCompPro-Italic"/>
                 <a:cs typeface="PFDinTextCompPro-Italic"/>
               </a:rPr>
-              <a:t>Q: What piece of the puzzle we’ve seen so far looks like it could intractably difficult in practice?</a:t>
-            </a:r>
-          </a:p>
-          <a:p>
-            <a:pPr algn="l"/>
-            <a:endParaRPr lang="en-US" sz="3000" i="1" dirty="0" smtClean="0">
-              <a:latin typeface="PFDinTextCompPro-Italic"/>
-              <a:cs typeface="PFDinTextCompPro-Italic"/>
-            </a:endParaRPr>
-          </a:p>
-          <a:p>
-            <a:pPr algn="l"/>
+              <a:t>The idea of Bayesian inference, then, is to </a:t>
+            </a:r>
+            <a:r>
+              <a:rPr lang="en-US" sz="3000" dirty="0" smtClean="0">
+                <a:latin typeface="PFDinTextCompPro-Medium"/>
+                <a:cs typeface="PFDinTextCompPro-Medium"/>
+              </a:rPr>
+              <a:t>update </a:t>
+            </a:r>
             <a:r>
               <a:rPr lang="en-US" sz="3000" dirty="0" smtClean="0">
                 <a:latin typeface="PFDinTextCompPro-Italic"/>
                 <a:cs typeface="PFDinTextCompPro-Italic"/>
               </a:rPr>
-              <a:t>A: Estimating the full likelihood </a:t>
-            </a:r>
-            <a:r>
-              <a:rPr lang="en-US" sz="3000" smtClean="0">
+              <a:t>our beliefs about the distribution of </a:t>
+            </a:r>
+            <a:r>
+              <a:rPr lang="en-US" sz="2000" i="1" dirty="0" smtClean="0">
+                <a:latin typeface="+mn-lt"/>
+                <a:cs typeface="PFDinTextCompPro-Italic"/>
+              </a:rPr>
+              <a:t>C</a:t>
+            </a:r>
+            <a:r>
+              <a:rPr lang="en-US" sz="3000" dirty="0" smtClean="0">
                 <a:latin typeface="PFDinTextCompPro-Italic"/>
                 <a:cs typeface="PFDinTextCompPro-Italic"/>
               </a:rPr>
-              <a:t>function.</a:t>
-            </a:r>
-          </a:p>
+              <a:t> using the data (“evidence”) at our disposal.</a:t>
+            </a:r>
+          </a:p>
+        </p:txBody>
+      </p:sp>
+      <p:sp>
+        <p:nvSpPr>
+          <p:cNvPr id="10" name="TextBox 9"/>
+          <p:cNvSpPr txBox="1"/>
+          <p:nvPr/>
+        </p:nvSpPr>
+        <p:spPr>
+          <a:xfrm>
+            <a:off x="566737" y="3518237"/>
+            <a:ext cx="8382000" cy="553998"/>
+          </a:xfrm>
+          <a:prstGeom prst="rect">
+            <a:avLst/>
+          </a:prstGeom>
+          <a:noFill/>
+        </p:spPr>
+        <p:txBody>
+          <a:bodyPr wrap="square" rtlCol="0">
+            <a:spAutoFit/>
+          </a:bodyPr>
+          <a:lstStyle/>
           <a:p>
             <a:pPr algn="l"/>
-            <a:endParaRPr lang="en-US" sz="3000">
-              <a:latin typeface="PFDinTextCompPro-Italic"/>
-              <a:cs typeface="PFDinTextCompPro-Italic"/>
-            </a:endParaRPr>
-          </a:p>
-          <a:p>
-            <a:r>
-              <a:rPr lang="en-US" sz="2000" i="1">
-                <a:cs typeface="PFDinTextCompPro-Italic"/>
-              </a:rPr>
-              <a:t>P({x</a:t>
-            </a:r>
-            <a:r>
-              <a:rPr lang="en-US" sz="2000" i="1" baseline="-25000">
-                <a:cs typeface="PFDinTextCompPro-Italic"/>
-              </a:rPr>
-              <a:t>i</a:t>
-            </a:r>
-            <a:r>
-              <a:rPr lang="en-US" sz="2000" i="1">
-                <a:cs typeface="PFDinTextCompPro-Italic"/>
-              </a:rPr>
-              <a:t>}|C) = P({x</a:t>
-            </a:r>
-            <a:r>
-              <a:rPr lang="en-US" sz="2000" i="1" baseline="-25000">
-                <a:cs typeface="PFDinTextCompPro-Italic"/>
-              </a:rPr>
-              <a:t>1</a:t>
-            </a:r>
-            <a:r>
-              <a:rPr lang="en-US" sz="2000" i="1">
-                <a:cs typeface="PFDinTextCompPro-Italic"/>
-              </a:rPr>
-              <a:t>, x</a:t>
-            </a:r>
-            <a:r>
-              <a:rPr lang="en-US" sz="2000" i="1" baseline="-25000">
-                <a:cs typeface="PFDinTextCompPro-Italic"/>
-              </a:rPr>
-              <a:t>2</a:t>
-            </a:r>
-            <a:r>
-              <a:rPr lang="en-US" sz="2000" i="1">
-                <a:cs typeface="PFDinTextCompPro-Italic"/>
-              </a:rPr>
-              <a:t>, …, x</a:t>
-            </a:r>
-            <a:r>
-              <a:rPr lang="en-US" sz="2000" i="1" baseline="-25000">
-                <a:cs typeface="PFDinTextCompPro-Italic"/>
-              </a:rPr>
-              <a:t>n</a:t>
-            </a:r>
-            <a:r>
-              <a:rPr lang="en-US" sz="2000" i="1">
-                <a:cs typeface="PFDinTextCompPro-Italic"/>
-              </a:rPr>
-              <a:t>})|C)</a:t>
-            </a:r>
-          </a:p>
-          <a:p>
-            <a:endParaRPr lang="en-US" sz="2000" i="1">
-              <a:cs typeface="PFDinTextCompPro-Italic"/>
-            </a:endParaRPr>
-          </a:p>
-          <a:p>
-            <a:pPr algn="l"/>
-            <a:r>
-              <a:rPr lang="en-US" sz="3000">
+            <a:r>
+              <a:rPr lang="en-US" sz="3000" dirty="0" smtClean="0">
                 <a:latin typeface="PFDinTextCompPro-Italic"/>
                 <a:cs typeface="PFDinTextCompPro-Italic"/>
               </a:rPr>
-              <a:t>Observing this exactly would require us to have enough data for every possible combination of features to make a reasonable estimate</a:t>
-            </a:r>
-            <a:r>
-              <a:rPr lang="en-US" sz="3000" smtClean="0">
-                <a:latin typeface="PFDinTextCompPro-Italic"/>
-                <a:cs typeface="PFDinTextCompPro-Italic"/>
-              </a:rPr>
-              <a:t>.</a:t>
-            </a:r>
-            <a:endParaRPr lang="en-US" sz="3000" i="1">
-              <a:cs typeface="PFDinTextCompPro-Italic"/>
-            </a:endParaRPr>
+              <a:t>Then we can use the posterior for prediction.</a:t>
+            </a:r>
           </a:p>
         </p:txBody>
       </p:sp>
     </p:spTree>
     <p:extLst>
       <p:ext uri="{BB962C8B-B14F-4D97-AF65-F5344CB8AC3E}">
-        <p14:creationId xmlns:p14="http://schemas.microsoft.com/office/powerpoint/2010/main" val="3695158805"/>
+        <p14:creationId xmlns:p14="http://schemas.microsoft.com/office/powerpoint/2010/main" val="3681629127"/>
       </p:ext>
     </p:extLst>
   </p:cSld>
@@ -11021,159 +11023,7 @@
   <p:timing>
     <p:tnLst>
       <p:par>
-        <p:cTn id="1" dur="indefinite" restart="never" nodeType="tmRoot">
-          <p:childTnLst>
-            <p:seq concurrent="1" nextAc="seek">
-              <p:cTn id="2" dur="indefinite" nodeType="mainSeq">
-                <p:childTnLst>
-                  <p:par>
-                    <p:cTn id="3" fill="hold">
-                      <p:stCondLst>
-                        <p:cond delay="indefinite"/>
-                      </p:stCondLst>
-                      <p:childTnLst>
-                        <p:par>
-                          <p:cTn id="4" fill="hold">
-                            <p:stCondLst>
-                              <p:cond delay="0"/>
-                            </p:stCondLst>
-                            <p:childTnLst>
-                              <p:par>
-                                <p:cTn id="5" presetID="1" presetClass="entr" presetSubtype="0" fill="hold" nodeType="clickEffect">
-                                  <p:stCondLst>
-                                    <p:cond delay="0"/>
-                                  </p:stCondLst>
-                                  <p:childTnLst>
-                                    <p:set>
-                                      <p:cBhvr>
-                                        <p:cTn id="6" dur="1" fill="hold">
-                                          <p:stCondLst>
-                                            <p:cond delay="0"/>
-                                          </p:stCondLst>
-                                        </p:cTn>
-                                        <p:tgtEl>
-                                          <p:spTgt spid="9">
-                                            <p:txEl>
-                                              <p:pRg st="2" end="2"/>
-                                            </p:txEl>
-                                          </p:spTgt>
-                                        </p:tgtEl>
-                                        <p:attrNameLst>
-                                          <p:attrName>style.visibility</p:attrName>
-                                        </p:attrNameLst>
-                                      </p:cBhvr>
-                                      <p:to>
-                                        <p:strVal val="visible"/>
-                                      </p:to>
-                                    </p:set>
-                                  </p:childTnLst>
-                                </p:cTn>
-                              </p:par>
-                              <p:par>
-                                <p:cTn id="7" presetID="1" presetClass="entr" presetSubtype="0" fill="hold" nodeType="withEffect">
-                                  <p:stCondLst>
-                                    <p:cond delay="0"/>
-                                  </p:stCondLst>
-                                  <p:childTnLst>
-                                    <p:set>
-                                      <p:cBhvr>
-                                        <p:cTn id="8" dur="1" fill="hold">
-                                          <p:stCondLst>
-                                            <p:cond delay="0"/>
-                                          </p:stCondLst>
-                                        </p:cTn>
-                                        <p:tgtEl>
-                                          <p:spTgt spid="9">
-                                            <p:txEl>
-                                              <p:pRg st="4" end="4"/>
-                                            </p:txEl>
-                                          </p:spTgt>
-                                        </p:tgtEl>
-                                        <p:attrNameLst>
-                                          <p:attrName>style.visibility</p:attrName>
-                                        </p:attrNameLst>
-                                      </p:cBhvr>
-                                      <p:to>
-                                        <p:strVal val="visible"/>
-                                      </p:to>
-                                    </p:set>
-                                  </p:childTnLst>
-                                </p:cTn>
-                              </p:par>
-                            </p:childTnLst>
-                          </p:cTn>
-                        </p:par>
-                      </p:childTnLst>
-                    </p:cTn>
-                  </p:par>
-                  <p:par>
-                    <p:cTn id="9" fill="hold">
-                      <p:stCondLst>
-                        <p:cond delay="indefinite"/>
-                      </p:stCondLst>
-                      <p:childTnLst>
-                        <p:par>
-                          <p:cTn id="10" fill="hold">
-                            <p:stCondLst>
-                              <p:cond delay="0"/>
-                            </p:stCondLst>
-                            <p:childTnLst>
-                              <p:par>
-                                <p:cTn id="11" presetID="1" presetClass="entr" presetSubtype="0" fill="hold" nodeType="clickEffect">
-                                  <p:stCondLst>
-                                    <p:cond delay="0"/>
-                                  </p:stCondLst>
-                                  <p:childTnLst>
-                                    <p:set>
-                                      <p:cBhvr>
-                                        <p:cTn id="12" dur="1" fill="hold">
-                                          <p:stCondLst>
-                                            <p:cond delay="0"/>
-                                          </p:stCondLst>
-                                        </p:cTn>
-                                        <p:tgtEl>
-                                          <p:spTgt spid="9">
-                                            <p:txEl>
-                                              <p:pRg st="6" end="6"/>
-                                            </p:txEl>
-                                          </p:spTgt>
-                                        </p:tgtEl>
-                                        <p:attrNameLst>
-                                          <p:attrName>style.visibility</p:attrName>
-                                        </p:attrNameLst>
-                                      </p:cBhvr>
-                                      <p:to>
-                                        <p:strVal val="visible"/>
-                                      </p:to>
-                                    </p:set>
-                                  </p:childTnLst>
-                                </p:cTn>
-                              </p:par>
-                            </p:childTnLst>
-                          </p:cTn>
-                        </p:par>
-                      </p:childTnLst>
-                    </p:cTn>
-                  </p:par>
-                </p:childTnLst>
-              </p:cTn>
-              <p:prevCondLst>
-                <p:cond evt="onPrev" delay="0">
-                  <p:tgtEl>
-                    <p:sldTgt/>
-                  </p:tgtEl>
-                </p:cond>
-              </p:prevCondLst>
-              <p:nextCondLst>
-                <p:cond evt="onNext" delay="0">
-                  <p:tgtEl>
-                    <p:sldTgt/>
-                  </p:tgtEl>
-                </p:cond>
-              </p:nextCondLst>
-            </p:seq>
-          </p:childTnLst>
-        </p:cTn>
+        <p:cTn id="1" dur="indefinite" restart="never" nodeType="tmRoot"/>
       </p:par>
     </p:tnLst>
   </p:timing>
@@ -11276,7 +11126,7 @@
         <p:spPr>
           <a:xfrm>
             <a:off x="566737" y="1104900"/>
-            <a:ext cx="8382000" cy="4093428"/>
+            <a:ext cx="8382000" cy="3847207"/>
           </a:xfrm>
           <a:prstGeom prst="rect">
             <a:avLst/>
@@ -11295,218 +11145,13 @@
                 <a:latin typeface="PFDinTextCompPro-Italic"/>
                 <a:cs typeface="PFDinTextCompPro-Italic"/>
               </a:rPr>
-              <a:t>Q: So what can we do about it?</a:t>
+              <a:t>Q: What piece of the puzzle we’ve seen so far looks like it could intractably difficult in practice?</a:t>
             </a:r>
           </a:p>
           <a:p>
             <a:pPr algn="l"/>
-            <a:endParaRPr lang="en-US" sz="3000" dirty="0">
+            <a:endParaRPr lang="en-US" sz="3000" i="1" dirty="0" smtClean="0">
               <a:latin typeface="PFDinTextCompPro-Italic"/>
-              <a:cs typeface="PFDinTextCompPro-Italic"/>
-            </a:endParaRPr>
-          </a:p>
-          <a:p>
-            <a:pPr algn="l"/>
-            <a:r>
-              <a:rPr lang="en-US" sz="3000" dirty="0">
-                <a:latin typeface="PFDinTextCompPro-Italic"/>
-                <a:cs typeface="PFDinTextCompPro-Italic"/>
-              </a:rPr>
-              <a:t>A: Make a simplifying assumption. In particular, we assume that the features </a:t>
-            </a:r>
-            <a:r>
-              <a:rPr lang="en-US" sz="2000" i="1" dirty="0">
-                <a:latin typeface="+mn-lt"/>
-                <a:cs typeface="PFDinTextCompPro-Italic"/>
-              </a:rPr>
-              <a:t>x</a:t>
-            </a:r>
-            <a:r>
-              <a:rPr lang="en-US" sz="2000" i="1" baseline="-25000" dirty="0">
-                <a:latin typeface="+mn-lt"/>
-                <a:cs typeface="PFDinTextCompPro-Italic"/>
-              </a:rPr>
-              <a:t>i</a:t>
-            </a:r>
-            <a:r>
-              <a:rPr lang="en-US" sz="3200" i="1" baseline="-25000" dirty="0">
-                <a:cs typeface="PFDinTextCompPro-Italic"/>
-              </a:rPr>
-              <a:t> </a:t>
-            </a:r>
-            <a:r>
-              <a:rPr lang="en-US" sz="3000" dirty="0">
-                <a:latin typeface="PFDinTextCompPro-Italic"/>
-                <a:cs typeface="PFDinTextCompPro-Italic"/>
-              </a:rPr>
-              <a:t>are conditionally independent from each other:</a:t>
-            </a:r>
-          </a:p>
-          <a:p>
-            <a:pPr algn="l"/>
-            <a:endParaRPr lang="en-US" sz="3000" dirty="0">
-              <a:latin typeface="PFDinTextCompPro-Italic"/>
-              <a:cs typeface="PFDinTextCompPro-Italic"/>
-            </a:endParaRPr>
-          </a:p>
-          <a:p>
-            <a:pPr algn="l">
-              <a:lnSpc>
-                <a:spcPct val="150000"/>
-              </a:lnSpc>
-            </a:pPr>
-            <a:r>
-              <a:rPr lang="en-US" sz="2000" i="1" dirty="0">
-                <a:latin typeface="+mn-lt"/>
-                <a:cs typeface="PFDinTextCompPro-Italic"/>
-              </a:rPr>
-              <a:t>P({x</a:t>
-            </a:r>
-            <a:r>
-              <a:rPr lang="en-US" sz="2000" i="1" baseline="-25000" dirty="0">
-                <a:latin typeface="+mn-lt"/>
-                <a:cs typeface="PFDinTextCompPro-Italic"/>
-              </a:rPr>
-              <a:t>i</a:t>
-            </a:r>
-            <a:r>
-              <a:rPr lang="en-US" sz="2000" i="1" dirty="0">
-                <a:latin typeface="+mn-lt"/>
-                <a:cs typeface="PFDinTextCompPro-Italic"/>
-              </a:rPr>
-              <a:t>}|C) </a:t>
-            </a:r>
-            <a:r>
-              <a:rPr lang="en-US" sz="2000" i="1" dirty="0" smtClean="0">
-                <a:latin typeface="+mn-lt"/>
-                <a:cs typeface="PFDinTextCompPro-Italic"/>
-              </a:rPr>
-              <a:t> =  P(x</a:t>
-            </a:r>
-            <a:r>
-              <a:rPr lang="en-US" sz="2000" i="1" baseline="-25000" dirty="0" smtClean="0">
-                <a:latin typeface="+mn-lt"/>
-                <a:cs typeface="PFDinTextCompPro-Italic"/>
-              </a:rPr>
-              <a:t>1</a:t>
-            </a:r>
-            <a:r>
-              <a:rPr lang="en-US" sz="2000" i="1" dirty="0">
-                <a:latin typeface="+mn-lt"/>
-                <a:cs typeface="PFDinTextCompPro-Italic"/>
-              </a:rPr>
-              <a:t>, x</a:t>
-            </a:r>
-            <a:r>
-              <a:rPr lang="en-US" sz="2000" i="1" baseline="-25000" dirty="0">
-                <a:latin typeface="+mn-lt"/>
-                <a:cs typeface="PFDinTextCompPro-Italic"/>
-              </a:rPr>
-              <a:t>2</a:t>
-            </a:r>
-            <a:r>
-              <a:rPr lang="en-US" sz="2000" i="1" dirty="0">
-                <a:latin typeface="+mn-lt"/>
-                <a:cs typeface="PFDinTextCompPro-Italic"/>
-              </a:rPr>
-              <a:t>, </a:t>
-            </a:r>
-            <a:r>
-              <a:rPr lang="en-US" sz="2000" i="1">
-                <a:latin typeface="+mn-lt"/>
-                <a:cs typeface="PFDinTextCompPro-Italic"/>
-              </a:rPr>
-              <a:t>…, </a:t>
-            </a:r>
-            <a:r>
-              <a:rPr lang="en-US" sz="2000" i="1" smtClean="0">
-                <a:latin typeface="+mn-lt"/>
-                <a:cs typeface="PFDinTextCompPro-Italic"/>
-              </a:rPr>
-              <a:t>x</a:t>
-            </a:r>
-            <a:r>
-              <a:rPr lang="en-US" sz="2000" i="1" baseline="-25000" smtClean="0">
-                <a:latin typeface="+mn-lt"/>
-                <a:cs typeface="PFDinTextCompPro-Italic"/>
-              </a:rPr>
-              <a:t>n</a:t>
-            </a:r>
-            <a:r>
-              <a:rPr lang="en-US" sz="2000" i="1" smtClean="0">
-                <a:latin typeface="+mn-lt"/>
-                <a:cs typeface="PFDinTextCompPro-Italic"/>
-              </a:rPr>
-              <a:t>|C</a:t>
-            </a:r>
-            <a:r>
-              <a:rPr lang="en-US" sz="2000" i="1" dirty="0" smtClean="0">
-                <a:latin typeface="+mn-lt"/>
-                <a:cs typeface="PFDinTextCompPro-Italic"/>
-              </a:rPr>
-              <a:t>)  ≈   P(x</a:t>
-            </a:r>
-            <a:r>
-              <a:rPr lang="en-US" sz="2000" i="1" baseline="-25000" dirty="0" smtClean="0">
-                <a:latin typeface="+mn-lt"/>
-                <a:cs typeface="PFDinTextCompPro-Italic"/>
-              </a:rPr>
-              <a:t>1</a:t>
-            </a:r>
-            <a:r>
-              <a:rPr lang="en-US" sz="2000" i="1" dirty="0" smtClean="0">
-                <a:latin typeface="+mn-lt"/>
-                <a:cs typeface="PFDinTextCompPro-Italic"/>
-              </a:rPr>
-              <a:t>|C) * P(x</a:t>
-            </a:r>
-            <a:r>
-              <a:rPr lang="en-US" sz="2000" i="1" baseline="-25000" dirty="0" smtClean="0">
-                <a:latin typeface="+mn-lt"/>
-                <a:cs typeface="PFDinTextCompPro-Italic"/>
-              </a:rPr>
-              <a:t>2</a:t>
-            </a:r>
-            <a:r>
-              <a:rPr lang="en-US" sz="2000" i="1" dirty="0" smtClean="0">
-                <a:latin typeface="+mn-lt"/>
-                <a:cs typeface="PFDinTextCompPro-Italic"/>
-              </a:rPr>
-              <a:t>|C) * … * P(</a:t>
-            </a:r>
-            <a:r>
-              <a:rPr lang="en-US" sz="2000" i="1" dirty="0" err="1" smtClean="0">
-                <a:latin typeface="+mn-lt"/>
-                <a:cs typeface="PFDinTextCompPro-Italic"/>
-              </a:rPr>
-              <a:t>x</a:t>
-            </a:r>
-            <a:r>
-              <a:rPr lang="en-US" sz="2000" i="1" baseline="-25000" dirty="0" err="1" smtClean="0">
-                <a:latin typeface="+mn-lt"/>
-                <a:cs typeface="PFDinTextCompPro-Italic"/>
-              </a:rPr>
-              <a:t>n</a:t>
-            </a:r>
-            <a:r>
-              <a:rPr lang="en-US" sz="2000" i="1" dirty="0" err="1" smtClean="0">
-                <a:latin typeface="+mn-lt"/>
-                <a:cs typeface="PFDinTextCompPro-Italic"/>
-              </a:rPr>
-              <a:t>|C</a:t>
-            </a:r>
-            <a:r>
-              <a:rPr lang="en-US" sz="2000" i="1" dirty="0" smtClean="0">
-                <a:latin typeface="+mn-lt"/>
-                <a:cs typeface="PFDinTextCompPro-Italic"/>
-              </a:rPr>
-              <a:t>)</a:t>
-            </a:r>
-          </a:p>
-          <a:p>
-            <a:pPr algn="l"/>
-            <a:endParaRPr lang="en-US" sz="2000" i="1" dirty="0">
-              <a:latin typeface="+mn-lt"/>
               <a:cs typeface="PFDinTextCompPro-Italic"/>
             </a:endParaRPr>
           </a:p>
@@ -11517,24 +11162,101 @@
                 <a:latin typeface="PFDinTextCompPro-Italic"/>
                 <a:cs typeface="PFDinTextCompPro-Italic"/>
               </a:rPr>
-              <a:t>This “naïve” assumption simplifies the likelihood function</a:t>
-            </a:r>
-            <a:r>
-              <a:rPr lang="en-US" sz="3000" dirty="0">
+              <a:t>A: Estimating the full likelihood </a:t>
+            </a:r>
+            <a:r>
+              <a:rPr lang="en-US" sz="3000" smtClean="0">
                 <a:latin typeface="PFDinTextCompPro-Italic"/>
                 <a:cs typeface="PFDinTextCompPro-Italic"/>
               </a:rPr>
-              <a:t> </a:t>
-            </a:r>
-            <a:r>
-              <a:rPr lang="en-US" sz="3000" dirty="0" smtClean="0">
+              <a:t>function.</a:t>
+            </a:r>
+          </a:p>
+          <a:p>
+            <a:pPr algn="l"/>
+            <a:endParaRPr lang="en-US" sz="2000">
+              <a:latin typeface="PFDinTextCompPro-Italic"/>
+              <a:cs typeface="PFDinTextCompPro-Italic"/>
+            </a:endParaRPr>
+          </a:p>
+          <a:p>
+            <a:r>
+              <a:rPr lang="en-US" sz="2400" i="1">
+                <a:cs typeface="PFDinTextCompPro-Italic"/>
+              </a:rPr>
+              <a:t>P({x</a:t>
+            </a:r>
+            <a:r>
+              <a:rPr lang="en-US" sz="2400" i="1" baseline="-25000">
+                <a:cs typeface="PFDinTextCompPro-Italic"/>
+              </a:rPr>
+              <a:t>i</a:t>
+            </a:r>
+            <a:r>
+              <a:rPr lang="en-US" sz="2400" i="1">
+                <a:cs typeface="PFDinTextCompPro-Italic"/>
+              </a:rPr>
+              <a:t>}|C) = P({x</a:t>
+            </a:r>
+            <a:r>
+              <a:rPr lang="en-US" sz="2400" i="1" baseline="-25000">
+                <a:cs typeface="PFDinTextCompPro-Italic"/>
+              </a:rPr>
+              <a:t>1</a:t>
+            </a:r>
+            <a:r>
+              <a:rPr lang="en-US" sz="2400" i="1">
+                <a:cs typeface="PFDinTextCompPro-Italic"/>
+              </a:rPr>
+              <a:t>, x</a:t>
+            </a:r>
+            <a:r>
+              <a:rPr lang="en-US" sz="2400" i="1" baseline="-25000">
+                <a:cs typeface="PFDinTextCompPro-Italic"/>
+              </a:rPr>
+              <a:t>2</a:t>
+            </a:r>
+            <a:r>
+              <a:rPr lang="en-US" sz="2400" i="1">
+                <a:cs typeface="PFDinTextCompPro-Italic"/>
+              </a:rPr>
+              <a:t>, …, x</a:t>
+            </a:r>
+            <a:r>
+              <a:rPr lang="en-US" sz="2400" i="1" baseline="-25000">
+                <a:cs typeface="PFDinTextCompPro-Italic"/>
+              </a:rPr>
+              <a:t>n</a:t>
+            </a:r>
+            <a:r>
+              <a:rPr lang="en-US" sz="2400" i="1">
+                <a:cs typeface="PFDinTextCompPro-Italic"/>
+              </a:rPr>
+              <a:t>})|C)</a:t>
+            </a:r>
+          </a:p>
+          <a:p>
+            <a:endParaRPr lang="en-US" sz="2000" i="1">
+              <a:cs typeface="PFDinTextCompPro-Italic"/>
+            </a:endParaRPr>
+          </a:p>
+          <a:p>
+            <a:pPr algn="l"/>
+            <a:r>
+              <a:rPr lang="en-US" sz="3000">
                 <a:latin typeface="PFDinTextCompPro-Italic"/>
                 <a:cs typeface="PFDinTextCompPro-Italic"/>
               </a:rPr>
-              <a:t>to make it tractable.</a:t>
-            </a:r>
-            <a:endParaRPr lang="en-US" sz="3000" i="1" dirty="0" smtClean="0">
-              <a:latin typeface="+mn-lt"/>
+              <a:t>Observing this exactly would require us to have enough data for every possible combination of features to make a reasonable estimate</a:t>
+            </a:r>
+            <a:r>
+              <a:rPr lang="en-US" sz="3000" smtClean="0">
+                <a:latin typeface="PFDinTextCompPro-Italic"/>
+                <a:cs typeface="PFDinTextCompPro-Italic"/>
+              </a:rPr>
+              <a:t>.</a:t>
+            </a:r>
+            <a:endParaRPr lang="en-US" sz="3000" i="1">
               <a:cs typeface="PFDinTextCompPro-Italic"/>
             </a:endParaRPr>
           </a:p>
@@ -11543,7 +11265,7 @@
     </p:spTree>
     <p:extLst>
       <p:ext uri="{BB962C8B-B14F-4D97-AF65-F5344CB8AC3E}">
-        <p14:creationId xmlns:p14="http://schemas.microsoft.com/office/powerpoint/2010/main" val="1429998355"/>
+        <p14:creationId xmlns:p14="http://schemas.microsoft.com/office/powerpoint/2010/main" val="3695158805"/>
       </p:ext>
     </p:extLst>
   </p:cSld>
@@ -11742,39 +11464,347 @@
         </p:nvSpPr>
         <p:spPr>
           <a:xfrm>
-            <a:off x="371475" y="495300"/>
+            <a:off x="414337" y="495300"/>
             <a:ext cx="6400800" cy="304800"/>
           </a:xfrm>
         </p:spPr>
         <p:txBody>
-          <a:bodyPr wrap="square" lIns="91440" tIns="45720" rIns="91440" bIns="45720" numCol="1" anchor="t" anchorCtr="0" compatLnSpc="1">
-            <a:prstTxWarp prst="textNoShape">
-              <a:avLst/>
-            </a:prstTxWarp>
+          <a:bodyPr/>
+          <a:lstStyle/>
+          <a:p>
+            <a:pPr eaLnBrk="1" hangingPunct="1">
+              <a:lnSpc>
+                <a:spcPts val="2448"/>
+              </a:lnSpc>
+              <a:defRPr/>
+            </a:pPr>
+            <a:r>
+              <a:rPr lang="en-US" dirty="0" smtClean="0"/>
+              <a:t>Naïve </a:t>
+            </a:r>
+            <a:r>
+              <a:rPr lang="en-US" dirty="0" err="1" smtClean="0"/>
+              <a:t>bayes</a:t>
+            </a:r>
+            <a:r>
+              <a:rPr lang="en-US" dirty="0" smtClean="0"/>
+              <a:t> classification</a:t>
+            </a:r>
+          </a:p>
+        </p:txBody>
+      </p:sp>
+      <p:sp>
+        <p:nvSpPr>
+          <p:cNvPr id="8" name="Slide Number Placeholder 3"/>
+          <p:cNvSpPr>
+            <a:spLocks noGrp="1"/>
+          </p:cNvSpPr>
+          <p:nvPr>
+            <p:ph type="sldNum" sz="quarter" idx="13"/>
+          </p:nvPr>
+        </p:nvSpPr>
+        <p:spPr/>
+        <p:txBody>
+          <a:bodyPr/>
+          <a:lstStyle/>
+          <a:p>
+            <a:pPr>
+              <a:defRPr/>
+            </a:pPr>
+            <a:fld id="{BD5AD749-DAD1-6A4A-A2AA-CB20EAD0AEB7}" type="slidenum">
+              <a:rPr lang="en-US"/>
+              <a:pPr>
+                <a:defRPr/>
+              </a:pPr>
+              <a:t>19</a:t>
+            </a:fld>
+            <a:endParaRPr lang="en-US"/>
+          </a:p>
+        </p:txBody>
+      </p:sp>
+      <p:sp>
+        <p:nvSpPr>
+          <p:cNvPr id="9" name="TextBox 8"/>
+          <p:cNvSpPr txBox="1"/>
+          <p:nvPr/>
+        </p:nvSpPr>
+        <p:spPr>
+          <a:xfrm>
+            <a:off x="566737" y="1104900"/>
+            <a:ext cx="8382000" cy="4093428"/>
+          </a:xfrm>
+          <a:prstGeom prst="rect">
+            <a:avLst/>
+          </a:prstGeom>
+          <a:noFill/>
+        </p:spPr>
+        <p:txBody>
+          <a:bodyPr wrap="square" rtlCol="0">
+            <a:spAutoFit/>
           </a:bodyPr>
           <a:lstStyle/>
           <a:p>
-            <a:pPr marL="0" indent="0"/>
-            <a:r>
-              <a:rPr lang="en-US" cap="none" smtClean="0">
-                <a:latin typeface="PFDinTextCompPro-Bold" charset="0"/>
-                <a:ea typeface="ヒラギノ角ゴ ProN W3" charset="0"/>
-                <a:cs typeface="ヒラギノ角ゴ ProN W3" charset="0"/>
+            <a:pPr algn="l"/>
+            <a:r>
+              <a:rPr lang="en-US" sz="3000" dirty="0" smtClean="0">
+                <a:latin typeface="PFDinTextCompPro-Italic"/>
+                <a:cs typeface="PFDinTextCompPro-Italic"/>
               </a:rPr>
-              <a:t>DATA </a:t>
-            </a:r>
-            <a:r>
-              <a:rPr lang="en-US" cap="none" dirty="0" smtClean="0">
-                <a:latin typeface="PFDinTextCompPro-Bold" charset="0"/>
-                <a:ea typeface="ヒラギノ角ゴ ProN W3" charset="0"/>
-                <a:cs typeface="ヒラギノ角ゴ ProN W3" charset="0"/>
+              <a:t>Q: So what can we do about it?</a:t>
+            </a:r>
+          </a:p>
+          <a:p>
+            <a:pPr algn="l"/>
+            <a:endParaRPr lang="en-US" sz="3000" dirty="0">
+              <a:latin typeface="PFDinTextCompPro-Italic"/>
+              <a:cs typeface="PFDinTextCompPro-Italic"/>
+            </a:endParaRPr>
+          </a:p>
+          <a:p>
+            <a:pPr algn="l"/>
+            <a:r>
+              <a:rPr lang="en-US" sz="3000" dirty="0">
+                <a:latin typeface="PFDinTextCompPro-Italic"/>
+                <a:cs typeface="PFDinTextCompPro-Italic"/>
               </a:rPr>
-              <a:t>SCIENCE</a:t>
-            </a:r>
-            <a:endParaRPr lang="en-US" cap="none" dirty="0">
-              <a:latin typeface="PFDinTextCompPro-Bold" charset="0"/>
-              <a:ea typeface="ヒラギノ角ゴ ProN W3" charset="0"/>
-              <a:cs typeface="ヒラギノ角ゴ ProN W3" charset="0"/>
+              <a:t>A: Make a simplifying assumption. In particular, we assume that the features </a:t>
+            </a:r>
+            <a:r>
+              <a:rPr lang="en-US" sz="2000" i="1" dirty="0">
+                <a:latin typeface="+mn-lt"/>
+                <a:cs typeface="PFDinTextCompPro-Italic"/>
+              </a:rPr>
+              <a:t>x</a:t>
+            </a:r>
+            <a:r>
+              <a:rPr lang="en-US" sz="2000" i="1" baseline="-25000" dirty="0">
+                <a:latin typeface="+mn-lt"/>
+                <a:cs typeface="PFDinTextCompPro-Italic"/>
+              </a:rPr>
+              <a:t>i</a:t>
+            </a:r>
+            <a:r>
+              <a:rPr lang="en-US" sz="3200" i="1" baseline="-25000" dirty="0">
+                <a:cs typeface="PFDinTextCompPro-Italic"/>
+              </a:rPr>
+              <a:t> </a:t>
+            </a:r>
+            <a:r>
+              <a:rPr lang="en-US" sz="3000" dirty="0">
+                <a:latin typeface="PFDinTextCompPro-Italic"/>
+                <a:cs typeface="PFDinTextCompPro-Italic"/>
+              </a:rPr>
+              <a:t>are conditionally independent from each other:</a:t>
+            </a:r>
+          </a:p>
+          <a:p>
+            <a:pPr algn="l"/>
+            <a:endParaRPr lang="en-US" sz="3000" dirty="0">
+              <a:latin typeface="PFDinTextCompPro-Italic"/>
+              <a:cs typeface="PFDinTextCompPro-Italic"/>
+            </a:endParaRPr>
+          </a:p>
+          <a:p>
+            <a:pPr algn="l">
+              <a:lnSpc>
+                <a:spcPct val="150000"/>
+              </a:lnSpc>
+            </a:pPr>
+            <a:r>
+              <a:rPr lang="en-US" sz="2000" i="1" dirty="0">
+                <a:latin typeface="+mn-lt"/>
+                <a:cs typeface="PFDinTextCompPro-Italic"/>
+              </a:rPr>
+              <a:t>P({x</a:t>
+            </a:r>
+            <a:r>
+              <a:rPr lang="en-US" sz="2000" i="1" baseline="-25000" dirty="0">
+                <a:latin typeface="+mn-lt"/>
+                <a:cs typeface="PFDinTextCompPro-Italic"/>
+              </a:rPr>
+              <a:t>i</a:t>
+            </a:r>
+            <a:r>
+              <a:rPr lang="en-US" sz="2000" i="1" dirty="0">
+                <a:latin typeface="+mn-lt"/>
+                <a:cs typeface="PFDinTextCompPro-Italic"/>
+              </a:rPr>
+              <a:t>}|C) </a:t>
+            </a:r>
+            <a:r>
+              <a:rPr lang="en-US" sz="2000" i="1" dirty="0" smtClean="0">
+                <a:latin typeface="+mn-lt"/>
+                <a:cs typeface="PFDinTextCompPro-Italic"/>
+              </a:rPr>
+              <a:t> =  </a:t>
+            </a:r>
+            <a:r>
+              <a:rPr lang="en-US" sz="2000" i="1" smtClean="0">
+                <a:latin typeface="+mn-lt"/>
+                <a:cs typeface="PFDinTextCompPro-Italic"/>
+              </a:rPr>
+              <a:t>P</a:t>
+            </a:r>
+            <a:r>
+              <a:rPr lang="en-US" sz="2000" i="1" smtClean="0">
+                <a:latin typeface="+mn-lt"/>
+                <a:cs typeface="PFDinTextCompPro-Italic"/>
+              </a:rPr>
+              <a:t>({x</a:t>
+            </a:r>
+            <a:r>
+              <a:rPr lang="en-US" sz="2000" i="1" baseline="-25000" smtClean="0">
+                <a:latin typeface="+mn-lt"/>
+                <a:cs typeface="PFDinTextCompPro-Italic"/>
+              </a:rPr>
+              <a:t>1</a:t>
+            </a:r>
+            <a:r>
+              <a:rPr lang="en-US" sz="2000" i="1" dirty="0">
+                <a:latin typeface="+mn-lt"/>
+                <a:cs typeface="PFDinTextCompPro-Italic"/>
+              </a:rPr>
+              <a:t>, x</a:t>
+            </a:r>
+            <a:r>
+              <a:rPr lang="en-US" sz="2000" i="1" baseline="-25000" dirty="0">
+                <a:latin typeface="+mn-lt"/>
+                <a:cs typeface="PFDinTextCompPro-Italic"/>
+              </a:rPr>
+              <a:t>2</a:t>
+            </a:r>
+            <a:r>
+              <a:rPr lang="en-US" sz="2000" i="1" dirty="0">
+                <a:latin typeface="+mn-lt"/>
+                <a:cs typeface="PFDinTextCompPro-Italic"/>
+              </a:rPr>
+              <a:t>, </a:t>
+            </a:r>
+            <a:r>
+              <a:rPr lang="en-US" sz="2000" i="1">
+                <a:latin typeface="+mn-lt"/>
+                <a:cs typeface="PFDinTextCompPro-Italic"/>
+              </a:rPr>
+              <a:t>…, </a:t>
+            </a:r>
+            <a:r>
+              <a:rPr lang="en-US" sz="2000" i="1" smtClean="0">
+                <a:latin typeface="+mn-lt"/>
+                <a:cs typeface="PFDinTextCompPro-Italic"/>
+              </a:rPr>
+              <a:t>x</a:t>
+            </a:r>
+            <a:r>
+              <a:rPr lang="en-US" sz="2000" i="1" baseline="-25000" smtClean="0">
+                <a:latin typeface="+mn-lt"/>
+                <a:cs typeface="PFDinTextCompPro-Italic"/>
+              </a:rPr>
+              <a:t>n</a:t>
+            </a:r>
+            <a:r>
+              <a:rPr lang="en-US" sz="2000" i="1" smtClean="0">
+                <a:latin typeface="+mn-lt"/>
+                <a:cs typeface="PFDinTextCompPro-Italic"/>
+              </a:rPr>
+              <a:t>}|C</a:t>
+            </a:r>
+            <a:r>
+              <a:rPr lang="en-US" sz="2000" i="1" dirty="0" smtClean="0">
+                <a:latin typeface="+mn-lt"/>
+                <a:cs typeface="PFDinTextCompPro-Italic"/>
+              </a:rPr>
+              <a:t>)  ≈   P(x</a:t>
+            </a:r>
+            <a:r>
+              <a:rPr lang="en-US" sz="2000" i="1" baseline="-25000" dirty="0" smtClean="0">
+                <a:latin typeface="+mn-lt"/>
+                <a:cs typeface="PFDinTextCompPro-Italic"/>
+              </a:rPr>
+              <a:t>1</a:t>
+            </a:r>
+            <a:r>
+              <a:rPr lang="en-US" sz="2000" i="1" dirty="0" smtClean="0">
+                <a:latin typeface="+mn-lt"/>
+                <a:cs typeface="PFDinTextCompPro-Italic"/>
+              </a:rPr>
+              <a:t>|C) * P(x</a:t>
+            </a:r>
+            <a:r>
+              <a:rPr lang="en-US" sz="2000" i="1" baseline="-25000" dirty="0" smtClean="0">
+                <a:latin typeface="+mn-lt"/>
+                <a:cs typeface="PFDinTextCompPro-Italic"/>
+              </a:rPr>
+              <a:t>2</a:t>
+            </a:r>
+            <a:r>
+              <a:rPr lang="en-US" sz="2000" i="1" dirty="0" smtClean="0">
+                <a:latin typeface="+mn-lt"/>
+                <a:cs typeface="PFDinTextCompPro-Italic"/>
+              </a:rPr>
+              <a:t>|C) * … * P(</a:t>
+            </a:r>
+            <a:r>
+              <a:rPr lang="en-US" sz="2000" i="1" dirty="0" err="1" smtClean="0">
+                <a:latin typeface="+mn-lt"/>
+                <a:cs typeface="PFDinTextCompPro-Italic"/>
+              </a:rPr>
+              <a:t>x</a:t>
+            </a:r>
+            <a:r>
+              <a:rPr lang="en-US" sz="2000" i="1" baseline="-25000" dirty="0" err="1" smtClean="0">
+                <a:latin typeface="+mn-lt"/>
+                <a:cs typeface="PFDinTextCompPro-Italic"/>
+              </a:rPr>
+              <a:t>n</a:t>
+            </a:r>
+            <a:r>
+              <a:rPr lang="en-US" sz="2000" i="1" dirty="0" err="1" smtClean="0">
+                <a:latin typeface="+mn-lt"/>
+                <a:cs typeface="PFDinTextCompPro-Italic"/>
+              </a:rPr>
+              <a:t>|C</a:t>
+            </a:r>
+            <a:r>
+              <a:rPr lang="en-US" sz="2000" i="1" dirty="0" smtClean="0">
+                <a:latin typeface="+mn-lt"/>
+                <a:cs typeface="PFDinTextCompPro-Italic"/>
+              </a:rPr>
+              <a:t>)</a:t>
+            </a:r>
+          </a:p>
+          <a:p>
+            <a:pPr algn="l"/>
+            <a:endParaRPr lang="en-US" sz="2000" i="1" dirty="0">
+              <a:latin typeface="+mn-lt"/>
+              <a:cs typeface="PFDinTextCompPro-Italic"/>
+            </a:endParaRPr>
+          </a:p>
+          <a:p>
+            <a:pPr algn="l"/>
+            <a:r>
+              <a:rPr lang="en-US" sz="3000" dirty="0" smtClean="0">
+                <a:latin typeface="PFDinTextCompPro-Italic"/>
+                <a:cs typeface="PFDinTextCompPro-Italic"/>
+              </a:rPr>
+              <a:t>This “naïve” assumption simplifies the likelihood function</a:t>
+            </a:r>
+            <a:r>
+              <a:rPr lang="en-US" sz="3000" dirty="0">
+                <a:latin typeface="PFDinTextCompPro-Italic"/>
+                <a:cs typeface="PFDinTextCompPro-Italic"/>
+              </a:rPr>
+              <a:t> </a:t>
+            </a:r>
+            <a:r>
+              <a:rPr lang="en-US" sz="3000" dirty="0" smtClean="0">
+                <a:latin typeface="PFDinTextCompPro-Italic"/>
+                <a:cs typeface="PFDinTextCompPro-Italic"/>
+              </a:rPr>
+              <a:t>to make it tractable.</a:t>
+            </a:r>
+            <a:endParaRPr lang="en-US" sz="3000" i="1" dirty="0" smtClean="0">
+              <a:latin typeface="+mn-lt"/>
+              <a:cs typeface="PFDinTextCompPro-Italic"/>
             </a:endParaRPr>
           </a:p>
         </p:txBody>
@@ -11782,7 +11812,7 @@
     </p:spTree>
     <p:extLst>
       <p:ext uri="{BB962C8B-B14F-4D97-AF65-F5344CB8AC3E}">
-        <p14:creationId xmlns:p14="http://schemas.microsoft.com/office/powerpoint/2010/main" val="2943625627"/>
+        <p14:creationId xmlns:p14="http://schemas.microsoft.com/office/powerpoint/2010/main" val="1429998355"/>
       </p:ext>
     </p:extLst>
   </p:cSld>
@@ -11793,7 +11823,159 @@
   <p:timing>
     <p:tnLst>
       <p:par>
-        <p:cTn id="1" dur="indefinite" restart="never" nodeType="tmRoot"/>
+        <p:cTn id="1" dur="indefinite" restart="never" nodeType="tmRoot">
+          <p:childTnLst>
+            <p:seq concurrent="1" nextAc="seek">
+              <p:cTn id="2" dur="indefinite" nodeType="mainSeq">
+                <p:childTnLst>
+                  <p:par>
+                    <p:cTn id="3" fill="hold">
+                      <p:stCondLst>
+                        <p:cond delay="indefinite"/>
+                      </p:stCondLst>
+                      <p:childTnLst>
+                        <p:par>
+                          <p:cTn id="4" fill="hold">
+                            <p:stCondLst>
+                              <p:cond delay="0"/>
+                            </p:stCondLst>
+                            <p:childTnLst>
+                              <p:par>
+                                <p:cTn id="5" presetID="1" presetClass="entr" presetSubtype="0" fill="hold" nodeType="clickEffect">
+                                  <p:stCondLst>
+                                    <p:cond delay="0"/>
+                                  </p:stCondLst>
+                                  <p:childTnLst>
+                                    <p:set>
+                                      <p:cBhvr>
+                                        <p:cTn id="6" dur="1" fill="hold">
+                                          <p:stCondLst>
+                                            <p:cond delay="0"/>
+                                          </p:stCondLst>
+                                        </p:cTn>
+                                        <p:tgtEl>
+                                          <p:spTgt spid="9">
+                                            <p:txEl>
+                                              <p:pRg st="2" end="2"/>
+                                            </p:txEl>
+                                          </p:spTgt>
+                                        </p:tgtEl>
+                                        <p:attrNameLst>
+                                          <p:attrName>style.visibility</p:attrName>
+                                        </p:attrNameLst>
+                                      </p:cBhvr>
+                                      <p:to>
+                                        <p:strVal val="visible"/>
+                                      </p:to>
+                                    </p:set>
+                                  </p:childTnLst>
+                                </p:cTn>
+                              </p:par>
+                              <p:par>
+                                <p:cTn id="7" presetID="1" presetClass="entr" presetSubtype="0" fill="hold" nodeType="withEffect">
+                                  <p:stCondLst>
+                                    <p:cond delay="0"/>
+                                  </p:stCondLst>
+                                  <p:childTnLst>
+                                    <p:set>
+                                      <p:cBhvr>
+                                        <p:cTn id="8" dur="1" fill="hold">
+                                          <p:stCondLst>
+                                            <p:cond delay="0"/>
+                                          </p:stCondLst>
+                                        </p:cTn>
+                                        <p:tgtEl>
+                                          <p:spTgt spid="9">
+                                            <p:txEl>
+                                              <p:pRg st="4" end="4"/>
+                                            </p:txEl>
+                                          </p:spTgt>
+                                        </p:tgtEl>
+                                        <p:attrNameLst>
+                                          <p:attrName>style.visibility</p:attrName>
+                                        </p:attrNameLst>
+                                      </p:cBhvr>
+                                      <p:to>
+                                        <p:strVal val="visible"/>
+                                      </p:to>
+                                    </p:set>
+                                  </p:childTnLst>
+                                </p:cTn>
+                              </p:par>
+                            </p:childTnLst>
+                          </p:cTn>
+                        </p:par>
+                      </p:childTnLst>
+                    </p:cTn>
+                  </p:par>
+                  <p:par>
+                    <p:cTn id="9" fill="hold">
+                      <p:stCondLst>
+                        <p:cond delay="indefinite"/>
+                      </p:stCondLst>
+                      <p:childTnLst>
+                        <p:par>
+                          <p:cTn id="10" fill="hold">
+                            <p:stCondLst>
+                              <p:cond delay="0"/>
+                            </p:stCondLst>
+                            <p:childTnLst>
+                              <p:par>
+                                <p:cTn id="11" presetID="1" presetClass="entr" presetSubtype="0" fill="hold" nodeType="clickEffect">
+                                  <p:stCondLst>
+                                    <p:cond delay="0"/>
+                                  </p:stCondLst>
+                                  <p:childTnLst>
+                                    <p:set>
+                                      <p:cBhvr>
+                                        <p:cTn id="12" dur="1" fill="hold">
+                                          <p:stCondLst>
+                                            <p:cond delay="0"/>
+                                          </p:stCondLst>
+                                        </p:cTn>
+                                        <p:tgtEl>
+                                          <p:spTgt spid="9">
+                                            <p:txEl>
+                                              <p:pRg st="6" end="6"/>
+                                            </p:txEl>
+                                          </p:spTgt>
+                                        </p:tgtEl>
+                                        <p:attrNameLst>
+                                          <p:attrName>style.visibility</p:attrName>
+                                        </p:attrNameLst>
+                                      </p:cBhvr>
+                                      <p:to>
+                                        <p:strVal val="visible"/>
+                                      </p:to>
+                                    </p:set>
+                                  </p:childTnLst>
+                                </p:cTn>
+                              </p:par>
+                            </p:childTnLst>
+                          </p:cTn>
+                        </p:par>
+                      </p:childTnLst>
+                    </p:cTn>
+                  </p:par>
+                </p:childTnLst>
+              </p:cTn>
+              <p:prevCondLst>
+                <p:cond evt="onPrev" delay="0">
+                  <p:tgtEl>
+                    <p:sldTgt/>
+                  </p:tgtEl>
+                </p:cond>
+              </p:prevCondLst>
+              <p:nextCondLst>
+                <p:cond evt="onNext" delay="0">
+                  <p:tgtEl>
+                    <p:sldTgt/>
+                  </p:tgtEl>
+                </p:cond>
+              </p:nextCondLst>
+            </p:seq>
+          </p:childTnLst>
+        </p:cTn>
       </p:par>
     </p:tnLst>
   </p:timing>
@@ -11851,7 +12033,7 @@
               </a14:hiddenLine>
             </a:ext>
             <a:ext uri="{FAA26D3D-D897-4be2-8F04-BA451C77F1D7}">
-              <ma14:placeholderFlag xmlns="" xmlns:ma14="http://schemas.microsoft.com/office/mac/drawingml/2011/main" val="1"/>
+              <ma14:placeholderFlag xmlns:ma14="http://schemas.microsoft.com/office/mac/drawingml/2011/main" xmlns="" val="1"/>
             </a:ext>
           </a:extLst>
         </p:spPr>
@@ -12049,6 +12231,93 @@
     <p:extLst>
       <p:ext uri="{BB962C8B-B14F-4D97-AF65-F5344CB8AC3E}">
         <p14:creationId xmlns:p14="http://schemas.microsoft.com/office/powerpoint/2010/main" val="820825700"/>
+      </p:ext>
+    </p:extLst>
+  </p:cSld>
+  <p:clrMapOvr>
+    <a:masterClrMapping/>
+  </p:clrMapOvr>
+  <p:transition/>
+  <p:timing>
+    <p:tnLst>
+      <p:par>
+        <p:cTn id="1" dur="indefinite" restart="never" nodeType="tmRoot"/>
+      </p:par>
+    </p:tnLst>
+  </p:timing>
+</p:sld>
+</file>
+
+<file path=ppt/slides/slide20.xml><?xml version="1.0" encoding="utf-8"?>
+<p:sld xmlns:a="http://schemas.openxmlformats.org/drawingml/2006/main" xmlns:r="http://schemas.openxmlformats.org/officeDocument/2006/relationships" xmlns:p="http://schemas.openxmlformats.org/presentationml/2006/main">
+  <p:cSld>
+    <p:spTree>
+      <p:nvGrpSpPr>
+        <p:cNvPr id="1" name=""/>
+        <p:cNvGrpSpPr/>
+        <p:nvPr/>
+      </p:nvGrpSpPr>
+      <p:grpSpPr>
+        <a:xfrm>
+          <a:off x="0" y="0"/>
+          <a:ext cx="0" cy="0"/>
+          <a:chOff x="0" y="0"/>
+          <a:chExt cx="0" cy="0"/>
+        </a:xfrm>
+      </p:grpSpPr>
+      <p:sp>
+        <p:nvSpPr>
+          <p:cNvPr id="4" name="Content Placeholder 3"/>
+          <p:cNvSpPr>
+            <a:spLocks noGrp="1"/>
+          </p:cNvSpPr>
+          <p:nvPr>
+            <p:ph sz="quarter" idx="11"/>
+          </p:nvPr>
+        </p:nvSpPr>
+        <p:spPr>
+          <a:xfrm>
+            <a:off x="371475" y="495300"/>
+            <a:ext cx="6400800" cy="304800"/>
+          </a:xfrm>
+        </p:spPr>
+        <p:txBody>
+          <a:bodyPr wrap="square" lIns="91440" tIns="45720" rIns="91440" bIns="45720" numCol="1" anchor="t" anchorCtr="0" compatLnSpc="1">
+            <a:prstTxWarp prst="textNoShape">
+              <a:avLst/>
+            </a:prstTxWarp>
+          </a:bodyPr>
+          <a:lstStyle/>
+          <a:p>
+            <a:pPr marL="0" indent="0"/>
+            <a:r>
+              <a:rPr lang="en-US" cap="none" smtClean="0">
+                <a:latin typeface="PFDinTextCompPro-Bold" charset="0"/>
+                <a:ea typeface="ヒラギノ角ゴ ProN W3" charset="0"/>
+                <a:cs typeface="ヒラギノ角ゴ ProN W3" charset="0"/>
+              </a:rPr>
+              <a:t>DATA </a:t>
+            </a:r>
+            <a:r>
+              <a:rPr lang="en-US" cap="none" dirty="0" smtClean="0">
+                <a:latin typeface="PFDinTextCompPro-Bold" charset="0"/>
+                <a:ea typeface="ヒラギノ角ゴ ProN W3" charset="0"/>
+                <a:cs typeface="ヒラギノ角ゴ ProN W3" charset="0"/>
+              </a:rPr>
+              <a:t>SCIENCE</a:t>
+            </a:r>
+            <a:endParaRPr lang="en-US" cap="none" dirty="0">
+              <a:latin typeface="PFDinTextCompPro-Bold" charset="0"/>
+              <a:ea typeface="ヒラギノ角ゴ ProN W3" charset="0"/>
+              <a:cs typeface="ヒラギノ角ゴ ProN W3" charset="0"/>
+            </a:endParaRPr>
+          </a:p>
+        </p:txBody>
+      </p:sp>
+    </p:spTree>
+    <p:extLst>
+      <p:ext uri="{BB962C8B-B14F-4D97-AF65-F5344CB8AC3E}">
+        <p14:creationId xmlns:p14="http://schemas.microsoft.com/office/powerpoint/2010/main" val="2943625627"/>
       </p:ext>
     </p:extLst>
   </p:cSld>
@@ -12866,9 +13135,10 @@
               <a:defRPr/>
             </a:pPr>
             <a:r>
-              <a:rPr lang="en-US" dirty="0" smtClean="0"/>
-              <a:t>Bayes’ theorem</a:t>
-            </a:r>
+              <a:rPr lang="en-US" smtClean="0"/>
+              <a:t>Probability</a:t>
+            </a:r>
+            <a:endParaRPr lang="en-US" dirty="0" smtClean="0"/>
           </a:p>
         </p:txBody>
       </p:sp>
@@ -12901,80 +13171,64 @@
           </a:p>
         </p:txBody>
       </p:sp>
-      <p:sp>
-        <p:nvSpPr>
-          <p:cNvPr id="9" name="TextBox 8"/>
-          <p:cNvSpPr txBox="1"/>
+      <p:pic>
+        <p:nvPicPr>
+          <p:cNvPr id="3074" name="Picture 2"/>
+          <p:cNvPicPr>
+            <a:picLocks noChangeAspect="1" noChangeArrowheads="1"/>
+          </p:cNvPicPr>
           <p:nvPr/>
-        </p:nvSpPr>
-        <p:spPr>
+        </p:nvPicPr>
+        <p:blipFill>
+          <a:blip r:embed="rId3">
+            <a:extLst>
+              <a:ext uri="{28A0092B-C50C-407E-A947-70E740481C1C}">
+                <a14:useLocalDpi xmlns:a14="http://schemas.microsoft.com/office/drawing/2010/main" val="0"/>
+              </a:ext>
+            </a:extLst>
+          </a:blip>
+          <a:srcRect/>
+          <a:stretch>
+            <a:fillRect/>
+          </a:stretch>
+        </p:blipFill>
+        <p:spPr bwMode="auto">
           <a:xfrm>
-            <a:off x="566737" y="1104900"/>
-            <a:ext cx="8382000" cy="1569660"/>
+            <a:off x="2824163" y="1447800"/>
+            <a:ext cx="3714750" cy="3238500"/>
           </a:xfrm>
           <a:prstGeom prst="rect">
             <a:avLst/>
           </a:prstGeom>
           <a:noFill/>
+          <a:ln>
+            <a:noFill/>
+          </a:ln>
+          <a:extLst>
+            <a:ext uri="{909E8E84-426E-40DD-AFC4-6F175D3DCCD1}">
+              <a14:hiddenFill xmlns:a14="http://schemas.microsoft.com/office/drawing/2010/main">
+                <a:solidFill>
+                  <a:schemeClr val="accent1"/>
+                </a:solidFill>
+              </a14:hiddenFill>
+            </a:ext>
+            <a:ext uri="{91240B29-F687-4F45-9708-019B960494DF}">
+              <a14:hiddenLine xmlns:a14="http://schemas.microsoft.com/office/drawing/2010/main" w="9525">
+                <a:solidFill>
+                  <a:schemeClr val="tx1"/>
+                </a:solidFill>
+                <a:miter lim="800000"/>
+                <a:headEnd/>
+                <a:tailEnd/>
+              </a14:hiddenLine>
+            </a:ext>
+          </a:extLst>
         </p:spPr>
-        <p:txBody>
-          <a:bodyPr wrap="square" rtlCol="0">
-            <a:spAutoFit/>
-          </a:bodyPr>
-          <a:lstStyle/>
-          <a:p>
-            <a:pPr algn="l"/>
-            <a:r>
-              <a:rPr lang="en-US" sz="3000" smtClean="0">
-                <a:latin typeface="PFDinTextCompPro-Medium"/>
-                <a:cs typeface="PFDinTextCompPro-Medium"/>
-              </a:rPr>
-              <a:t>Bayes’ theorem:</a:t>
-            </a:r>
-          </a:p>
-          <a:p>
-            <a:pPr algn="l"/>
-            <a:endParaRPr lang="en-US" sz="3000" dirty="0" smtClean="0">
-              <a:latin typeface="PFDinTextCompPro-Italic"/>
-              <a:cs typeface="PFDinTextCompPro-Italic"/>
-            </a:endParaRPr>
-          </a:p>
-          <a:p>
-            <a:r>
-              <a:rPr lang="en-US" sz="3600" i="1" smtClean="0">
-                <a:latin typeface="+mn-lt"/>
-                <a:cs typeface="PFDinTextCompPro-Italic"/>
-                <a:sym typeface="Wingdings"/>
-              </a:rPr>
-              <a:t>P(A|B</a:t>
-            </a:r>
-            <a:r>
-              <a:rPr lang="en-US" sz="3600" i="1" dirty="0">
-                <a:latin typeface="+mn-lt"/>
-                <a:cs typeface="PFDinTextCompPro-Italic"/>
-                <a:sym typeface="Wingdings"/>
-              </a:rPr>
-              <a:t>) = P(B|A) * P(A) / P(B</a:t>
-            </a:r>
-            <a:r>
-              <a:rPr lang="en-US" sz="3600" i="1" dirty="0" smtClean="0">
-                <a:latin typeface="+mn-lt"/>
-                <a:cs typeface="PFDinTextCompPro-Italic"/>
-                <a:sym typeface="Wingdings"/>
-              </a:rPr>
-              <a:t>)</a:t>
-            </a:r>
-            <a:endParaRPr lang="en-US" sz="3600" dirty="0">
-              <a:latin typeface="+mn-lt"/>
-              <a:cs typeface="PFDinTextCompPro-Italic"/>
-            </a:endParaRPr>
-          </a:p>
-        </p:txBody>
-      </p:sp>
+      </p:pic>
     </p:spTree>
     <p:extLst>
       <p:ext uri="{BB962C8B-B14F-4D97-AF65-F5344CB8AC3E}">
-        <p14:creationId xmlns:p14="http://schemas.microsoft.com/office/powerpoint/2010/main" val="1448876000"/>
+        <p14:creationId xmlns:p14="http://schemas.microsoft.com/office/powerpoint/2010/main" val="1672502023"/>
       </p:ext>
     </p:extLst>
   </p:cSld>
@@ -13011,20 +13265,48 @@
       </p:grpSpPr>
       <p:sp>
         <p:nvSpPr>
-          <p:cNvPr id="2" name="Title 1"/>
+          <p:cNvPr id="4" name="Content Placeholder 3"/>
           <p:cNvSpPr>
             <a:spLocks noGrp="1"/>
           </p:cNvSpPr>
           <p:nvPr>
-            <p:ph type="title"/>
+            <p:ph sz="quarter" idx="11"/>
           </p:nvPr>
         </p:nvSpPr>
         <p:spPr>
           <a:xfrm>
-            <a:off x="347663" y="2705100"/>
-            <a:ext cx="8426450" cy="1828800"/>
+            <a:off x="414337" y="495300"/>
+            <a:ext cx="6400800" cy="304800"/>
           </a:xfrm>
         </p:spPr>
+        <p:txBody>
+          <a:bodyPr/>
+          <a:lstStyle/>
+          <a:p>
+            <a:pPr eaLnBrk="1" hangingPunct="1">
+              <a:lnSpc>
+                <a:spcPts val="2448"/>
+              </a:lnSpc>
+              <a:defRPr/>
+            </a:pPr>
+            <a:r>
+              <a:rPr lang="en-US" dirty="0" smtClean="0"/>
+              <a:t>Bayes’ theorem</a:t>
+            </a:r>
+          </a:p>
+        </p:txBody>
+      </p:sp>
+      <p:sp>
+        <p:nvSpPr>
+          <p:cNvPr id="8" name="Slide Number Placeholder 3"/>
+          <p:cNvSpPr>
+            <a:spLocks noGrp="1"/>
+          </p:cNvSpPr>
+          <p:nvPr>
+            <p:ph type="sldNum" sz="quarter" idx="13"/>
+          </p:nvPr>
+        </p:nvSpPr>
+        <p:spPr/>
         <p:txBody>
           <a:bodyPr/>
           <a:lstStyle/>
@@ -13032,74 +13314,83 @@
             <a:pPr>
               <a:defRPr/>
             </a:pPr>
-            <a:r>
-              <a:rPr lang="en-US" sz="7500" dirty="0" smtClean="0"/>
-              <a:t/>
-            </a:r>
-            <a:br>
-              <a:rPr lang="en-US" sz="7500" dirty="0" smtClean="0"/>
-            </a:br>
-            <a:r>
-              <a:rPr lang="en-US" sz="7500" dirty="0" smtClean="0"/>
-              <a:t>II. Naïve </a:t>
-            </a:r>
-            <a:r>
-              <a:rPr lang="en-US" sz="7500" dirty="0" err="1" smtClean="0"/>
-              <a:t>bayes</a:t>
-            </a:r>
-            <a:r>
-              <a:rPr lang="en-US" sz="7500" dirty="0" smtClean="0"/>
-              <a:t> classification</a:t>
-            </a:r>
-            <a:endParaRPr lang="en-US" sz="7500" dirty="0"/>
-          </a:p>
-        </p:txBody>
-      </p:sp>
-      <p:sp>
-        <p:nvSpPr>
-          <p:cNvPr id="4" name="Content Placeholder 3"/>
-          <p:cNvSpPr>
-            <a:spLocks noGrp="1"/>
-          </p:cNvSpPr>
-          <p:nvPr>
-            <p:ph sz="quarter" idx="11"/>
-          </p:nvPr>
+            <a:fld id="{BD5AD749-DAD1-6A4A-A2AA-CB20EAD0AEB7}" type="slidenum">
+              <a:rPr lang="en-US"/>
+              <a:pPr>
+                <a:defRPr/>
+              </a:pPr>
+              <a:t>9</a:t>
+            </a:fld>
+            <a:endParaRPr lang="en-US"/>
+          </a:p>
+        </p:txBody>
+      </p:sp>
+      <p:sp>
+        <p:nvSpPr>
+          <p:cNvPr id="9" name="TextBox 8"/>
+          <p:cNvSpPr txBox="1"/>
+          <p:nvPr/>
         </p:nvSpPr>
         <p:spPr>
           <a:xfrm>
-            <a:off x="371475" y="495300"/>
-            <a:ext cx="6400800" cy="304800"/>
+            <a:off x="566737" y="1104900"/>
+            <a:ext cx="8382000" cy="1569660"/>
           </a:xfrm>
+          <a:prstGeom prst="rect">
+            <a:avLst/>
+          </a:prstGeom>
+          <a:noFill/>
         </p:spPr>
         <p:txBody>
-          <a:bodyPr wrap="square" lIns="91440" tIns="45720" rIns="91440" bIns="45720" numCol="1" anchor="t" anchorCtr="0" compatLnSpc="1">
-            <a:prstTxWarp prst="textNoShape">
-              <a:avLst/>
-            </a:prstTxWarp>
+          <a:bodyPr wrap="square" rtlCol="0">
+            <a:spAutoFit/>
           </a:bodyPr>
           <a:lstStyle/>
           <a:p>
-            <a:pPr marL="0" indent="0"/>
-            <a:r>
-              <a:rPr lang="en-US" cap="none" smtClean="0">
-                <a:latin typeface="PFDinTextCompPro-Bold" charset="0"/>
-                <a:ea typeface="ヒラギノ角ゴ ProN W3" charset="0"/>
-                <a:cs typeface="ヒラギノ角ゴ ProN W3" charset="0"/>
+            <a:pPr algn="l"/>
+            <a:r>
+              <a:rPr lang="en-US" sz="3000" smtClean="0">
+                <a:latin typeface="PFDinTextCompPro-Medium"/>
+                <a:cs typeface="PFDinTextCompPro-Medium"/>
               </a:rPr>
-              <a:t>DATA </a:t>
-            </a:r>
-            <a:r>
-              <a:rPr lang="en-US" cap="none" dirty="0" smtClean="0">
-                <a:latin typeface="PFDinTextCompPro-Bold" charset="0"/>
-                <a:ea typeface="ヒラギノ角ゴ ProN W3" charset="0"/>
-                <a:cs typeface="ヒラギノ角ゴ ProN W3" charset="0"/>
+              <a:t>Bayes’ theorem:</a:t>
+            </a:r>
+          </a:p>
+          <a:p>
+            <a:pPr algn="l"/>
+            <a:endParaRPr lang="en-US" sz="3000" dirty="0" smtClean="0">
+              <a:latin typeface="PFDinTextCompPro-Italic"/>
+              <a:cs typeface="PFDinTextCompPro-Italic"/>
+            </a:endParaRPr>
+          </a:p>
+          <a:p>
+            <a:r>
+              <a:rPr lang="en-US" sz="3600" i="1" smtClean="0">
+                <a:latin typeface="+mn-lt"/>
+                <a:cs typeface="PFDinTextCompPro-Italic"/>
+                <a:sym typeface="Wingdings"/>
               </a:rPr>
-              <a:t>SCIENCE</a:t>
-            </a:r>
-            <a:endParaRPr lang="en-US" cap="none" dirty="0">
-              <a:latin typeface="PFDinTextCompPro-Bold" charset="0"/>
-              <a:ea typeface="ヒラギノ角ゴ ProN W3" charset="0"/>
-              <a:cs typeface="ヒラギノ角ゴ ProN W3" charset="0"/>
+              <a:t>P(A|B</a:t>
+            </a:r>
+            <a:r>
+              <a:rPr lang="en-US" sz="3600" i="1" dirty="0">
+                <a:latin typeface="+mn-lt"/>
+                <a:cs typeface="PFDinTextCompPro-Italic"/>
+                <a:sym typeface="Wingdings"/>
+              </a:rPr>
+              <a:t>) = P(B|A) * P(A) / P(B</a:t>
+            </a:r>
+            <a:r>
+              <a:rPr lang="en-US" sz="3600" i="1" dirty="0" smtClean="0">
+                <a:latin typeface="+mn-lt"/>
+                <a:cs typeface="PFDinTextCompPro-Italic"/>
+                <a:sym typeface="Wingdings"/>
+              </a:rPr>
+              <a:t>)</a:t>
+            </a:r>
+            <a:endParaRPr lang="en-US" sz="3600" dirty="0">
+              <a:latin typeface="+mn-lt"/>
+              <a:cs typeface="PFDinTextCompPro-Italic"/>
             </a:endParaRPr>
           </a:p>
         </p:txBody>
@@ -13107,7 +13398,7 @@
     </p:spTree>
     <p:extLst>
       <p:ext uri="{BB962C8B-B14F-4D97-AF65-F5344CB8AC3E}">
-        <p14:creationId xmlns:p14="http://schemas.microsoft.com/office/powerpoint/2010/main" val="2564836905"/>
+        <p14:creationId xmlns:p14="http://schemas.microsoft.com/office/powerpoint/2010/main" val="1448876000"/>
       </p:ext>
     </p:extLst>
   </p:cSld>

</xml_diff>